<commit_message>
final fix for admin page
</commit_message>
<xml_diff>
--- a/docu.pptx
+++ b/docu.pptx
@@ -8,10 +8,17 @@
     <p:sldId id="257" r:id="rId2"/>
     <p:sldId id="258" r:id="rId3"/>
     <p:sldId id="259" r:id="rId4"/>
-    <p:sldId id="265" r:id="rId5"/>
-    <p:sldId id="261" r:id="rId6"/>
-    <p:sldId id="264" r:id="rId7"/>
-    <p:sldId id="263" r:id="rId8"/>
+    <p:sldId id="266" r:id="rId5"/>
+    <p:sldId id="265" r:id="rId6"/>
+    <p:sldId id="261" r:id="rId7"/>
+    <p:sldId id="264" r:id="rId8"/>
+    <p:sldId id="263" r:id="rId9"/>
+    <p:sldId id="267" r:id="rId10"/>
+    <p:sldId id="268" r:id="rId11"/>
+    <p:sldId id="269" r:id="rId12"/>
+    <p:sldId id="270" r:id="rId13"/>
+    <p:sldId id="271" r:id="rId14"/>
+    <p:sldId id="272" r:id="rId15"/>
   </p:sldIdLst>
   <p:sldSz cx="12192000" cy="6858000"/>
   <p:notesSz cx="6858000" cy="9144000"/>
@@ -4474,6 +4481,1779 @@
 </p:sld>
 </file>
 
+<file path=ppt/slides/slide10.xml><?xml version="1.0" encoding="utf-8"?>
+<p:sld xmlns:a="http://schemas.openxmlformats.org/drawingml/2006/main" xmlns:r="http://schemas.openxmlformats.org/officeDocument/2006/relationships" xmlns:p="http://schemas.openxmlformats.org/presentationml/2006/main">
+  <p:cSld>
+    <p:spTree>
+      <p:nvGrpSpPr>
+        <p:cNvPr id="1" name=""/>
+        <p:cNvGrpSpPr/>
+        <p:nvPr/>
+      </p:nvGrpSpPr>
+      <p:grpSpPr>
+        <a:xfrm>
+          <a:off x="0" y="0"/>
+          <a:ext cx="0" cy="0"/>
+          <a:chOff x="0" y="0"/>
+          <a:chExt cx="0" cy="0"/>
+        </a:xfrm>
+      </p:grpSpPr>
+      <p:pic>
+        <p:nvPicPr>
+          <p:cNvPr id="2050" name="Picture 2" descr="No description available.">
+            <a:extLst>
+              <a:ext uri="{FF2B5EF4-FFF2-40B4-BE49-F238E27FC236}">
+                <a16:creationId xmlns:a16="http://schemas.microsoft.com/office/drawing/2014/main" id="{3E5D26B8-D4FA-6E9B-2D5B-6DB50B03F1DF}"/>
+              </a:ext>
+            </a:extLst>
+          </p:cNvPr>
+          <p:cNvPicPr>
+            <a:picLocks noChangeAspect="1" noChangeArrowheads="1"/>
+          </p:cNvPicPr>
+          <p:nvPr/>
+        </p:nvPicPr>
+        <p:blipFill>
+          <a:blip r:embed="rId2">
+            <a:extLst>
+              <a:ext uri="{28A0092B-C50C-407E-A947-70E740481C1C}">
+                <a14:useLocalDpi xmlns:a14="http://schemas.microsoft.com/office/drawing/2010/main" val="0"/>
+              </a:ext>
+            </a:extLst>
+          </a:blip>
+          <a:srcRect/>
+          <a:stretch>
+            <a:fillRect/>
+          </a:stretch>
+        </p:blipFill>
+        <p:spPr bwMode="auto">
+          <a:xfrm>
+            <a:off x="1072608" y="505918"/>
+            <a:ext cx="9773587" cy="5497643"/>
+          </a:xfrm>
+          <a:prstGeom prst="rect">
+            <a:avLst/>
+          </a:prstGeom>
+          <a:noFill/>
+          <a:extLst>
+            <a:ext uri="{909E8E84-426E-40DD-AFC4-6F175D3DCCD1}">
+              <a14:hiddenFill xmlns:a14="http://schemas.microsoft.com/office/drawing/2010/main">
+                <a:solidFill>
+                  <a:srgbClr val="FFFFFF"/>
+                </a:solidFill>
+              </a14:hiddenFill>
+            </a:ext>
+          </a:extLst>
+        </p:spPr>
+      </p:pic>
+      <p:sp>
+        <p:nvSpPr>
+          <p:cNvPr id="3" name="Rectangle: Rounded Corners 2">
+            <a:extLst>
+              <a:ext uri="{FF2B5EF4-FFF2-40B4-BE49-F238E27FC236}">
+                <a16:creationId xmlns:a16="http://schemas.microsoft.com/office/drawing/2014/main" id="{BD68C481-6775-3EFB-FC84-C7B3F95C7738}"/>
+              </a:ext>
+            </a:extLst>
+          </p:cNvPr>
+          <p:cNvSpPr/>
+          <p:nvPr/>
+        </p:nvSpPr>
+        <p:spPr>
+          <a:xfrm>
+            <a:off x="5138083" y="705654"/>
+            <a:ext cx="1063878" cy="336278"/>
+          </a:xfrm>
+          <a:prstGeom prst="roundRect">
+            <a:avLst/>
+          </a:prstGeom>
+          <a:solidFill>
+            <a:srgbClr val="21B9A0"/>
+          </a:solidFill>
+        </p:spPr>
+        <p:style>
+          <a:lnRef idx="1">
+            <a:schemeClr val="accent2"/>
+          </a:lnRef>
+          <a:fillRef idx="3">
+            <a:schemeClr val="accent2"/>
+          </a:fillRef>
+          <a:effectRef idx="2">
+            <a:schemeClr val="accent2"/>
+          </a:effectRef>
+          <a:fontRef idx="minor">
+            <a:schemeClr val="lt1"/>
+          </a:fontRef>
+        </p:style>
+        <p:txBody>
+          <a:bodyPr rtlCol="0" anchor="ctr"/>
+          <a:lstStyle/>
+          <a:p>
+            <a:pPr algn="ctr"/>
+            <a:r>
+              <a:rPr lang="en-PH" sz="1400" dirty="0"/>
+              <a:t>About us</a:t>
+            </a:r>
+          </a:p>
+        </p:txBody>
+      </p:sp>
+      <p:sp>
+        <p:nvSpPr>
+          <p:cNvPr id="4" name="Rectangle: Rounded Corners 3">
+            <a:extLst>
+              <a:ext uri="{FF2B5EF4-FFF2-40B4-BE49-F238E27FC236}">
+                <a16:creationId xmlns:a16="http://schemas.microsoft.com/office/drawing/2014/main" id="{2CA9B77F-0635-CCDB-E758-7A587AFEAF6C}"/>
+              </a:ext>
+            </a:extLst>
+          </p:cNvPr>
+          <p:cNvSpPr/>
+          <p:nvPr/>
+        </p:nvSpPr>
+        <p:spPr>
+          <a:xfrm>
+            <a:off x="9068072" y="705654"/>
+            <a:ext cx="688826" cy="336278"/>
+          </a:xfrm>
+          <a:prstGeom prst="roundRect">
+            <a:avLst/>
+          </a:prstGeom>
+          <a:solidFill>
+            <a:srgbClr val="21B9A0"/>
+          </a:solidFill>
+        </p:spPr>
+        <p:style>
+          <a:lnRef idx="1">
+            <a:schemeClr val="accent2"/>
+          </a:lnRef>
+          <a:fillRef idx="3">
+            <a:schemeClr val="accent2"/>
+          </a:fillRef>
+          <a:effectRef idx="2">
+            <a:schemeClr val="accent2"/>
+          </a:effectRef>
+          <a:fontRef idx="minor">
+            <a:schemeClr val="lt1"/>
+          </a:fontRef>
+        </p:style>
+        <p:txBody>
+          <a:bodyPr rtlCol="0" anchor="ctr"/>
+          <a:lstStyle/>
+          <a:p>
+            <a:pPr algn="ctr"/>
+            <a:r>
+              <a:rPr lang="en-PH" sz="1600" dirty="0"/>
+              <a:t>Login</a:t>
+            </a:r>
+          </a:p>
+        </p:txBody>
+      </p:sp>
+      <p:sp>
+        <p:nvSpPr>
+          <p:cNvPr id="5" name="Rectangle: Rounded Corners 4">
+            <a:extLst>
+              <a:ext uri="{FF2B5EF4-FFF2-40B4-BE49-F238E27FC236}">
+                <a16:creationId xmlns:a16="http://schemas.microsoft.com/office/drawing/2014/main" id="{E1D458E7-21E3-EE12-5BCB-1F66BC367DC8}"/>
+              </a:ext>
+            </a:extLst>
+          </p:cNvPr>
+          <p:cNvSpPr/>
+          <p:nvPr/>
+        </p:nvSpPr>
+        <p:spPr>
+          <a:xfrm>
+            <a:off x="6288514" y="705654"/>
+            <a:ext cx="854392" cy="336278"/>
+          </a:xfrm>
+          <a:prstGeom prst="roundRect">
+            <a:avLst/>
+          </a:prstGeom>
+          <a:solidFill>
+            <a:srgbClr val="21B9A0"/>
+          </a:solidFill>
+        </p:spPr>
+        <p:style>
+          <a:lnRef idx="1">
+            <a:schemeClr val="accent2"/>
+          </a:lnRef>
+          <a:fillRef idx="3">
+            <a:schemeClr val="accent2"/>
+          </a:fillRef>
+          <a:effectRef idx="2">
+            <a:schemeClr val="accent2"/>
+          </a:effectRef>
+          <a:fontRef idx="minor">
+            <a:schemeClr val="lt1"/>
+          </a:fontRef>
+        </p:style>
+        <p:txBody>
+          <a:bodyPr rtlCol="0" anchor="ctr"/>
+          <a:lstStyle/>
+          <a:p>
+            <a:pPr algn="ctr"/>
+            <a:r>
+              <a:rPr lang="en-PH" sz="1400" dirty="0"/>
+              <a:t>Property</a:t>
+            </a:r>
+          </a:p>
+        </p:txBody>
+      </p:sp>
+      <p:sp>
+        <p:nvSpPr>
+          <p:cNvPr id="6" name="Rectangle: Rounded Corners 5">
+            <a:extLst>
+              <a:ext uri="{FF2B5EF4-FFF2-40B4-BE49-F238E27FC236}">
+                <a16:creationId xmlns:a16="http://schemas.microsoft.com/office/drawing/2014/main" id="{30E03534-9D3E-95F8-4C62-09DC9C03E2EF}"/>
+              </a:ext>
+            </a:extLst>
+          </p:cNvPr>
+          <p:cNvSpPr/>
+          <p:nvPr/>
+        </p:nvSpPr>
+        <p:spPr>
+          <a:xfrm>
+            <a:off x="7229459" y="705654"/>
+            <a:ext cx="854392" cy="336278"/>
+          </a:xfrm>
+          <a:prstGeom prst="roundRect">
+            <a:avLst/>
+          </a:prstGeom>
+          <a:solidFill>
+            <a:srgbClr val="21B9A0"/>
+          </a:solidFill>
+        </p:spPr>
+        <p:style>
+          <a:lnRef idx="1">
+            <a:schemeClr val="accent2"/>
+          </a:lnRef>
+          <a:fillRef idx="3">
+            <a:schemeClr val="accent2"/>
+          </a:fillRef>
+          <a:effectRef idx="2">
+            <a:schemeClr val="accent2"/>
+          </a:effectRef>
+          <a:fontRef idx="minor">
+            <a:schemeClr val="lt1"/>
+          </a:fontRef>
+        </p:style>
+        <p:txBody>
+          <a:bodyPr rtlCol="0" anchor="ctr"/>
+          <a:lstStyle/>
+          <a:p>
+            <a:pPr algn="ctr"/>
+            <a:r>
+              <a:rPr lang="en-PH" sz="1400" dirty="0"/>
+              <a:t>Pages</a:t>
+            </a:r>
+          </a:p>
+        </p:txBody>
+      </p:sp>
+      <p:sp>
+        <p:nvSpPr>
+          <p:cNvPr id="7" name="Rectangle: Rounded Corners 6">
+            <a:extLst>
+              <a:ext uri="{FF2B5EF4-FFF2-40B4-BE49-F238E27FC236}">
+                <a16:creationId xmlns:a16="http://schemas.microsoft.com/office/drawing/2014/main" id="{74F1A828-1A25-EFCF-1480-9E18BFE25BD2}"/>
+              </a:ext>
+            </a:extLst>
+          </p:cNvPr>
+          <p:cNvSpPr/>
+          <p:nvPr/>
+        </p:nvSpPr>
+        <p:spPr>
+          <a:xfrm>
+            <a:off x="4221399" y="708040"/>
+            <a:ext cx="830131" cy="336278"/>
+          </a:xfrm>
+          <a:prstGeom prst="roundRect">
+            <a:avLst/>
+          </a:prstGeom>
+          <a:solidFill>
+            <a:srgbClr val="21B9A0"/>
+          </a:solidFill>
+        </p:spPr>
+        <p:style>
+          <a:lnRef idx="1">
+            <a:schemeClr val="accent2"/>
+          </a:lnRef>
+          <a:fillRef idx="3">
+            <a:schemeClr val="accent2"/>
+          </a:fillRef>
+          <a:effectRef idx="2">
+            <a:schemeClr val="accent2"/>
+          </a:effectRef>
+          <a:fontRef idx="minor">
+            <a:schemeClr val="lt1"/>
+          </a:fontRef>
+        </p:style>
+        <p:txBody>
+          <a:bodyPr rtlCol="0" anchor="ctr"/>
+          <a:lstStyle/>
+          <a:p>
+            <a:pPr algn="ctr"/>
+            <a:r>
+              <a:rPr lang="en-PH" sz="1400" dirty="0"/>
+              <a:t>Home</a:t>
+            </a:r>
+          </a:p>
+        </p:txBody>
+      </p:sp>
+      <p:sp>
+        <p:nvSpPr>
+          <p:cNvPr id="8" name="Rectangle: Rounded Corners 7">
+            <a:extLst>
+              <a:ext uri="{FF2B5EF4-FFF2-40B4-BE49-F238E27FC236}">
+                <a16:creationId xmlns:a16="http://schemas.microsoft.com/office/drawing/2014/main" id="{36A9DED9-6D4A-6FD2-AFE7-5C51E5D19FB2}"/>
+              </a:ext>
+            </a:extLst>
+          </p:cNvPr>
+          <p:cNvSpPr/>
+          <p:nvPr/>
+        </p:nvSpPr>
+        <p:spPr>
+          <a:xfrm>
+            <a:off x="8127127" y="705654"/>
+            <a:ext cx="854392" cy="336278"/>
+          </a:xfrm>
+          <a:prstGeom prst="roundRect">
+            <a:avLst/>
+          </a:prstGeom>
+          <a:solidFill>
+            <a:srgbClr val="21B9A0"/>
+          </a:solidFill>
+        </p:spPr>
+        <p:style>
+          <a:lnRef idx="1">
+            <a:schemeClr val="accent2"/>
+          </a:lnRef>
+          <a:fillRef idx="3">
+            <a:schemeClr val="accent2"/>
+          </a:fillRef>
+          <a:effectRef idx="2">
+            <a:schemeClr val="accent2"/>
+          </a:effectRef>
+          <a:fontRef idx="minor">
+            <a:schemeClr val="lt1"/>
+          </a:fontRef>
+        </p:style>
+        <p:txBody>
+          <a:bodyPr rtlCol="0" anchor="ctr"/>
+          <a:lstStyle/>
+          <a:p>
+            <a:pPr algn="ctr"/>
+            <a:r>
+              <a:rPr lang="en-PH" sz="1200" dirty="0"/>
+              <a:t>Contact</a:t>
+            </a:r>
+          </a:p>
+        </p:txBody>
+      </p:sp>
+      <p:sp>
+        <p:nvSpPr>
+          <p:cNvPr id="9" name="Rectangle: Rounded Corners 8">
+            <a:extLst>
+              <a:ext uri="{FF2B5EF4-FFF2-40B4-BE49-F238E27FC236}">
+                <a16:creationId xmlns:a16="http://schemas.microsoft.com/office/drawing/2014/main" id="{554BE270-0F60-A464-E650-788E07D39C11}"/>
+              </a:ext>
+            </a:extLst>
+          </p:cNvPr>
+          <p:cNvSpPr/>
+          <p:nvPr/>
+        </p:nvSpPr>
+        <p:spPr>
+          <a:xfrm>
+            <a:off x="8586023" y="5012563"/>
+            <a:ext cx="830131" cy="336278"/>
+          </a:xfrm>
+          <a:prstGeom prst="roundRect">
+            <a:avLst/>
+          </a:prstGeom>
+          <a:solidFill>
+            <a:srgbClr val="21B9A0"/>
+          </a:solidFill>
+        </p:spPr>
+        <p:style>
+          <a:lnRef idx="1">
+            <a:schemeClr val="accent2"/>
+          </a:lnRef>
+          <a:fillRef idx="3">
+            <a:schemeClr val="accent2"/>
+          </a:fillRef>
+          <a:effectRef idx="2">
+            <a:schemeClr val="accent2"/>
+          </a:effectRef>
+          <a:fontRef idx="minor">
+            <a:schemeClr val="lt1"/>
+          </a:fontRef>
+        </p:style>
+        <p:txBody>
+          <a:bodyPr rtlCol="0" anchor="ctr"/>
+          <a:lstStyle/>
+          <a:p>
+            <a:pPr algn="ctr"/>
+            <a:r>
+              <a:rPr lang="en-PH" sz="1400" dirty="0"/>
+              <a:t>Search</a:t>
+            </a:r>
+          </a:p>
+        </p:txBody>
+      </p:sp>
+    </p:spTree>
+    <p:extLst>
+      <p:ext uri="{BB962C8B-B14F-4D97-AF65-F5344CB8AC3E}">
+        <p14:creationId xmlns:p14="http://schemas.microsoft.com/office/powerpoint/2010/main" val="2060034415"/>
+      </p:ext>
+    </p:extLst>
+  </p:cSld>
+  <p:clrMapOvr>
+    <a:masterClrMapping/>
+  </p:clrMapOvr>
+</p:sld>
+</file>
+
+<file path=ppt/slides/slide11.xml><?xml version="1.0" encoding="utf-8"?>
+<p:sld xmlns:a="http://schemas.openxmlformats.org/drawingml/2006/main" xmlns:r="http://schemas.openxmlformats.org/officeDocument/2006/relationships" xmlns:p="http://schemas.openxmlformats.org/presentationml/2006/main">
+  <p:cSld>
+    <p:spTree>
+      <p:nvGrpSpPr>
+        <p:cNvPr id="1" name=""/>
+        <p:cNvGrpSpPr/>
+        <p:nvPr/>
+      </p:nvGrpSpPr>
+      <p:grpSpPr>
+        <a:xfrm>
+          <a:off x="0" y="0"/>
+          <a:ext cx="0" cy="0"/>
+          <a:chOff x="0" y="0"/>
+          <a:chExt cx="0" cy="0"/>
+        </a:xfrm>
+      </p:grpSpPr>
+      <p:pic>
+        <p:nvPicPr>
+          <p:cNvPr id="3074" name="Picture 2" descr="No description available.">
+            <a:extLst>
+              <a:ext uri="{FF2B5EF4-FFF2-40B4-BE49-F238E27FC236}">
+                <a16:creationId xmlns:a16="http://schemas.microsoft.com/office/drawing/2014/main" id="{6249F6B6-E316-337F-68E7-615231E64902}"/>
+              </a:ext>
+            </a:extLst>
+          </p:cNvPr>
+          <p:cNvPicPr>
+            <a:picLocks noChangeAspect="1" noChangeArrowheads="1"/>
+          </p:cNvPicPr>
+          <p:nvPr/>
+        </p:nvPicPr>
+        <p:blipFill>
+          <a:blip r:embed="rId2">
+            <a:extLst>
+              <a:ext uri="{28A0092B-C50C-407E-A947-70E740481C1C}">
+                <a14:useLocalDpi xmlns:a14="http://schemas.microsoft.com/office/drawing/2010/main" val="0"/>
+              </a:ext>
+            </a:extLst>
+          </a:blip>
+          <a:srcRect/>
+          <a:stretch>
+            <a:fillRect/>
+          </a:stretch>
+        </p:blipFill>
+        <p:spPr bwMode="auto">
+          <a:xfrm>
+            <a:off x="363895" y="1660849"/>
+            <a:ext cx="5421085" cy="3732244"/>
+          </a:xfrm>
+          <a:prstGeom prst="rect">
+            <a:avLst/>
+          </a:prstGeom>
+          <a:noFill/>
+          <a:extLst>
+            <a:ext uri="{909E8E84-426E-40DD-AFC4-6F175D3DCCD1}">
+              <a14:hiddenFill xmlns:a14="http://schemas.microsoft.com/office/drawing/2010/main">
+                <a:solidFill>
+                  <a:srgbClr val="FFFFFF"/>
+                </a:solidFill>
+              </a14:hiddenFill>
+            </a:ext>
+          </a:extLst>
+        </p:spPr>
+      </p:pic>
+      <p:sp>
+        <p:nvSpPr>
+          <p:cNvPr id="2" name="Title 1">
+            <a:extLst>
+              <a:ext uri="{FF2B5EF4-FFF2-40B4-BE49-F238E27FC236}">
+                <a16:creationId xmlns:a16="http://schemas.microsoft.com/office/drawing/2014/main" id="{29020A24-F62D-11F7-6597-6367F2242E82}"/>
+              </a:ext>
+            </a:extLst>
+          </p:cNvPr>
+          <p:cNvSpPr txBox="1">
+            <a:spLocks/>
+          </p:cNvSpPr>
+          <p:nvPr/>
+        </p:nvSpPr>
+        <p:spPr>
+          <a:xfrm>
+            <a:off x="1780437" y="2092923"/>
+            <a:ext cx="2588000" cy="436291"/>
+          </a:xfrm>
+          <a:prstGeom prst="rect">
+            <a:avLst/>
+          </a:prstGeom>
+        </p:spPr>
+        <p:txBody>
+          <a:bodyPr/>
+          <a:lstStyle>
+            <a:lvl1pPr algn="l" defTabSz="914400" rtl="0" eaLnBrk="1" latinLnBrk="0" hangingPunct="1">
+              <a:lnSpc>
+                <a:spcPct val="90000"/>
+              </a:lnSpc>
+              <a:spcBef>
+                <a:spcPct val="0"/>
+              </a:spcBef>
+              <a:buNone/>
+              <a:defRPr sz="4700" i="0" kern="1200" spc="-50" baseline="0">
+                <a:solidFill>
+                  <a:schemeClr val="tx1">
+                    <a:lumMod val="75000"/>
+                    <a:lumOff val="25000"/>
+                  </a:schemeClr>
+                </a:solidFill>
+                <a:latin typeface="+mj-lt"/>
+                <a:ea typeface="+mj-ea"/>
+                <a:cs typeface="+mj-cs"/>
+              </a:defRPr>
+            </a:lvl1pPr>
+          </a:lstStyle>
+          <a:p>
+            <a:pPr algn="ctr"/>
+            <a:r>
+              <a:rPr lang="en-PH" sz="1400" dirty="0">
+                <a:solidFill>
+                  <a:srgbClr val="21B9A0"/>
+                </a:solidFill>
+              </a:rPr>
+              <a:t>Property Types</a:t>
+            </a:r>
+          </a:p>
+        </p:txBody>
+      </p:sp>
+      <p:sp>
+        <p:nvSpPr>
+          <p:cNvPr id="3" name="Title 1">
+            <a:extLst>
+              <a:ext uri="{FF2B5EF4-FFF2-40B4-BE49-F238E27FC236}">
+                <a16:creationId xmlns:a16="http://schemas.microsoft.com/office/drawing/2014/main" id="{CEDDAEFA-F819-1C6D-9D4E-4D07567AB4CD}"/>
+              </a:ext>
+            </a:extLst>
+          </p:cNvPr>
+          <p:cNvSpPr txBox="1">
+            <a:spLocks/>
+          </p:cNvSpPr>
+          <p:nvPr/>
+        </p:nvSpPr>
+        <p:spPr>
+          <a:xfrm>
+            <a:off x="727477" y="2529214"/>
+            <a:ext cx="3390744" cy="832918"/>
+          </a:xfrm>
+          <a:prstGeom prst="rect">
+            <a:avLst/>
+          </a:prstGeom>
+        </p:spPr>
+        <p:txBody>
+          <a:bodyPr/>
+          <a:lstStyle>
+            <a:lvl1pPr algn="l" defTabSz="914400" rtl="0" eaLnBrk="1" latinLnBrk="0" hangingPunct="1">
+              <a:lnSpc>
+                <a:spcPct val="90000"/>
+              </a:lnSpc>
+              <a:spcBef>
+                <a:spcPct val="0"/>
+              </a:spcBef>
+              <a:buNone/>
+              <a:defRPr sz="4700" i="0" kern="1200" spc="-50" baseline="0">
+                <a:solidFill>
+                  <a:schemeClr val="tx1">
+                    <a:lumMod val="75000"/>
+                    <a:lumOff val="25000"/>
+                  </a:schemeClr>
+                </a:solidFill>
+                <a:latin typeface="+mj-lt"/>
+                <a:ea typeface="+mj-ea"/>
+                <a:cs typeface="+mj-cs"/>
+              </a:defRPr>
+            </a:lvl1pPr>
+          </a:lstStyle>
+          <a:p>
+            <a:pPr algn="ctr"/>
+            <a:endParaRPr lang="en-PH" sz="9600" dirty="0">
+              <a:solidFill>
+                <a:schemeClr val="bg1">
+                  <a:lumMod val="50000"/>
+                </a:schemeClr>
+              </a:solidFill>
+              <a:latin typeface="+mn-lt"/>
+            </a:endParaRPr>
+          </a:p>
+        </p:txBody>
+      </p:sp>
+      <p:pic>
+        <p:nvPicPr>
+          <p:cNvPr id="3076" name="Picture 4" descr="No description available.">
+            <a:extLst>
+              <a:ext uri="{FF2B5EF4-FFF2-40B4-BE49-F238E27FC236}">
+                <a16:creationId xmlns:a16="http://schemas.microsoft.com/office/drawing/2014/main" id="{8D01771F-5EED-777A-370B-E24042CF93B4}"/>
+              </a:ext>
+            </a:extLst>
+          </p:cNvPr>
+          <p:cNvPicPr>
+            <a:picLocks noChangeAspect="1" noChangeArrowheads="1"/>
+          </p:cNvPicPr>
+          <p:nvPr/>
+        </p:nvPicPr>
+        <p:blipFill>
+          <a:blip r:embed="rId3">
+            <a:extLst>
+              <a:ext uri="{28A0092B-C50C-407E-A947-70E740481C1C}">
+                <a14:useLocalDpi xmlns:a14="http://schemas.microsoft.com/office/drawing/2010/main" val="0"/>
+              </a:ext>
+            </a:extLst>
+          </a:blip>
+          <a:srcRect/>
+          <a:stretch>
+            <a:fillRect/>
+          </a:stretch>
+        </p:blipFill>
+        <p:spPr bwMode="auto">
+          <a:xfrm>
+            <a:off x="5909492" y="1660850"/>
+            <a:ext cx="5918613" cy="3732244"/>
+          </a:xfrm>
+          <a:prstGeom prst="rect">
+            <a:avLst/>
+          </a:prstGeom>
+          <a:noFill/>
+          <a:extLst>
+            <a:ext uri="{909E8E84-426E-40DD-AFC4-6F175D3DCCD1}">
+              <a14:hiddenFill xmlns:a14="http://schemas.microsoft.com/office/drawing/2010/main">
+                <a:solidFill>
+                  <a:srgbClr val="FFFFFF"/>
+                </a:solidFill>
+              </a14:hiddenFill>
+            </a:ext>
+          </a:extLst>
+        </p:spPr>
+      </p:pic>
+      <p:sp>
+        <p:nvSpPr>
+          <p:cNvPr id="4" name="Title 1">
+            <a:extLst>
+              <a:ext uri="{FF2B5EF4-FFF2-40B4-BE49-F238E27FC236}">
+                <a16:creationId xmlns:a16="http://schemas.microsoft.com/office/drawing/2014/main" id="{C17D865B-D765-E575-D9EE-628B66271221}"/>
+              </a:ext>
+            </a:extLst>
+          </p:cNvPr>
+          <p:cNvSpPr txBox="1">
+            <a:spLocks/>
+          </p:cNvSpPr>
+          <p:nvPr/>
+        </p:nvSpPr>
+        <p:spPr>
+          <a:xfrm>
+            <a:off x="8286984" y="4167430"/>
+            <a:ext cx="2107318" cy="329926"/>
+          </a:xfrm>
+          <a:prstGeom prst="rect">
+            <a:avLst/>
+          </a:prstGeom>
+        </p:spPr>
+        <p:txBody>
+          <a:bodyPr/>
+          <a:lstStyle>
+            <a:lvl1pPr algn="l" defTabSz="914400" rtl="0" eaLnBrk="1" latinLnBrk="0" hangingPunct="1">
+              <a:lnSpc>
+                <a:spcPct val="90000"/>
+              </a:lnSpc>
+              <a:spcBef>
+                <a:spcPct val="0"/>
+              </a:spcBef>
+              <a:buNone/>
+              <a:defRPr sz="4700" i="0" kern="1200" spc="-50" baseline="0">
+                <a:solidFill>
+                  <a:schemeClr val="tx1">
+                    <a:lumMod val="75000"/>
+                    <a:lumOff val="25000"/>
+                  </a:schemeClr>
+                </a:solidFill>
+                <a:latin typeface="+mj-lt"/>
+                <a:ea typeface="+mj-ea"/>
+                <a:cs typeface="+mj-cs"/>
+              </a:defRPr>
+            </a:lvl1pPr>
+          </a:lstStyle>
+          <a:p>
+            <a:pPr algn="ctr"/>
+            <a:r>
+              <a:rPr lang="en-PH" sz="1400" dirty="0">
+                <a:solidFill>
+                  <a:srgbClr val="21B9A0"/>
+                </a:solidFill>
+              </a:rPr>
+              <a:t>About</a:t>
+            </a:r>
+          </a:p>
+        </p:txBody>
+      </p:sp>
+      <p:sp>
+        <p:nvSpPr>
+          <p:cNvPr id="5" name="Title 1">
+            <a:extLst>
+              <a:ext uri="{FF2B5EF4-FFF2-40B4-BE49-F238E27FC236}">
+                <a16:creationId xmlns:a16="http://schemas.microsoft.com/office/drawing/2014/main" id="{2CE3066E-8A47-EB27-CEFF-68D495DC1A4B}"/>
+              </a:ext>
+            </a:extLst>
+          </p:cNvPr>
+          <p:cNvSpPr txBox="1">
+            <a:spLocks/>
+          </p:cNvSpPr>
+          <p:nvPr/>
+        </p:nvSpPr>
+        <p:spPr>
+          <a:xfrm>
+            <a:off x="7381137" y="1028615"/>
+            <a:ext cx="2588000" cy="436291"/>
+          </a:xfrm>
+          <a:prstGeom prst="rect">
+            <a:avLst/>
+          </a:prstGeom>
+        </p:spPr>
+        <p:txBody>
+          <a:bodyPr/>
+          <a:lstStyle>
+            <a:lvl1pPr algn="l" defTabSz="914400" rtl="0" eaLnBrk="1" latinLnBrk="0" hangingPunct="1">
+              <a:lnSpc>
+                <a:spcPct val="90000"/>
+              </a:lnSpc>
+              <a:spcBef>
+                <a:spcPct val="0"/>
+              </a:spcBef>
+              <a:buNone/>
+              <a:defRPr sz="4700" i="0" kern="1200" spc="-50" baseline="0">
+                <a:solidFill>
+                  <a:schemeClr val="tx1">
+                    <a:lumMod val="75000"/>
+                    <a:lumOff val="25000"/>
+                  </a:schemeClr>
+                </a:solidFill>
+                <a:latin typeface="+mj-lt"/>
+                <a:ea typeface="+mj-ea"/>
+                <a:cs typeface="+mj-cs"/>
+              </a:defRPr>
+            </a:lvl1pPr>
+          </a:lstStyle>
+          <a:p>
+            <a:pPr algn="ctr"/>
+            <a:r>
+              <a:rPr lang="en-PH" sz="1400" dirty="0">
+                <a:solidFill>
+                  <a:srgbClr val="21B9A0"/>
+                </a:solidFill>
+              </a:rPr>
+              <a:t>About Page</a:t>
+            </a:r>
+          </a:p>
+        </p:txBody>
+      </p:sp>
+      <p:pic>
+        <p:nvPicPr>
+          <p:cNvPr id="6" name="Picture 5">
+            <a:extLst>
+              <a:ext uri="{FF2B5EF4-FFF2-40B4-BE49-F238E27FC236}">
+                <a16:creationId xmlns:a16="http://schemas.microsoft.com/office/drawing/2014/main" id="{906281B8-F561-0816-DB60-D16F8C67E047}"/>
+              </a:ext>
+            </a:extLst>
+          </p:cNvPr>
+          <p:cNvPicPr>
+            <a:picLocks noChangeAspect="1"/>
+          </p:cNvPicPr>
+          <p:nvPr/>
+        </p:nvPicPr>
+        <p:blipFill>
+          <a:blip r:embed="rId4">
+            <a:extLst>
+              <a:ext uri="{28A0092B-C50C-407E-A947-70E740481C1C}">
+                <a14:useLocalDpi xmlns:a14="http://schemas.microsoft.com/office/drawing/2010/main" val="0"/>
+              </a:ext>
+            </a:extLst>
+          </a:blip>
+          <a:stretch>
+            <a:fillRect/>
+          </a:stretch>
+        </p:blipFill>
+        <p:spPr>
+          <a:xfrm>
+            <a:off x="735660" y="2736386"/>
+            <a:ext cx="1436040" cy="949790"/>
+          </a:xfrm>
+          <a:prstGeom prst="rect">
+            <a:avLst/>
+          </a:prstGeom>
+        </p:spPr>
+      </p:pic>
+      <p:pic>
+        <p:nvPicPr>
+          <p:cNvPr id="7" name="Picture 6">
+            <a:extLst>
+              <a:ext uri="{FF2B5EF4-FFF2-40B4-BE49-F238E27FC236}">
+                <a16:creationId xmlns:a16="http://schemas.microsoft.com/office/drawing/2014/main" id="{27376AB3-C28A-6425-A176-C87986D0299E}"/>
+              </a:ext>
+            </a:extLst>
+          </p:cNvPr>
+          <p:cNvPicPr>
+            <a:picLocks noChangeAspect="1"/>
+          </p:cNvPicPr>
+          <p:nvPr/>
+        </p:nvPicPr>
+        <p:blipFill>
+          <a:blip r:embed="rId4">
+            <a:extLst>
+              <a:ext uri="{28A0092B-C50C-407E-A947-70E740481C1C}">
+                <a14:useLocalDpi xmlns:a14="http://schemas.microsoft.com/office/drawing/2010/main" val="0"/>
+              </a:ext>
+            </a:extLst>
+          </a:blip>
+          <a:stretch>
+            <a:fillRect/>
+          </a:stretch>
+        </p:blipFill>
+        <p:spPr>
+          <a:xfrm>
+            <a:off x="727477" y="3902717"/>
+            <a:ext cx="1436040" cy="949790"/>
+          </a:xfrm>
+          <a:prstGeom prst="rect">
+            <a:avLst/>
+          </a:prstGeom>
+        </p:spPr>
+      </p:pic>
+      <p:pic>
+        <p:nvPicPr>
+          <p:cNvPr id="8" name="Picture 7">
+            <a:extLst>
+              <a:ext uri="{FF2B5EF4-FFF2-40B4-BE49-F238E27FC236}">
+                <a16:creationId xmlns:a16="http://schemas.microsoft.com/office/drawing/2014/main" id="{448192D9-D3A5-C1C4-8D4D-7DAE32B9639C}"/>
+              </a:ext>
+            </a:extLst>
+          </p:cNvPr>
+          <p:cNvPicPr>
+            <a:picLocks noChangeAspect="1"/>
+          </p:cNvPicPr>
+          <p:nvPr/>
+        </p:nvPicPr>
+        <p:blipFill>
+          <a:blip r:embed="rId4">
+            <a:extLst>
+              <a:ext uri="{28A0092B-C50C-407E-A947-70E740481C1C}">
+                <a14:useLocalDpi xmlns:a14="http://schemas.microsoft.com/office/drawing/2010/main" val="0"/>
+              </a:ext>
+            </a:extLst>
+          </a:blip>
+          <a:stretch>
+            <a:fillRect/>
+          </a:stretch>
+        </p:blipFill>
+        <p:spPr>
+          <a:xfrm>
+            <a:off x="2317540" y="2736386"/>
+            <a:ext cx="1436040" cy="949790"/>
+          </a:xfrm>
+          <a:prstGeom prst="rect">
+            <a:avLst/>
+          </a:prstGeom>
+        </p:spPr>
+      </p:pic>
+      <p:pic>
+        <p:nvPicPr>
+          <p:cNvPr id="9" name="Picture 8">
+            <a:extLst>
+              <a:ext uri="{FF2B5EF4-FFF2-40B4-BE49-F238E27FC236}">
+                <a16:creationId xmlns:a16="http://schemas.microsoft.com/office/drawing/2014/main" id="{B169EC55-C04C-9BC6-8878-F3CEBF422796}"/>
+              </a:ext>
+            </a:extLst>
+          </p:cNvPr>
+          <p:cNvPicPr>
+            <a:picLocks noChangeAspect="1"/>
+          </p:cNvPicPr>
+          <p:nvPr/>
+        </p:nvPicPr>
+        <p:blipFill>
+          <a:blip r:embed="rId4">
+            <a:extLst>
+              <a:ext uri="{28A0092B-C50C-407E-A947-70E740481C1C}">
+                <a14:useLocalDpi xmlns:a14="http://schemas.microsoft.com/office/drawing/2010/main" val="0"/>
+              </a:ext>
+            </a:extLst>
+          </a:blip>
+          <a:stretch>
+            <a:fillRect/>
+          </a:stretch>
+        </p:blipFill>
+        <p:spPr>
+          <a:xfrm>
+            <a:off x="2324100" y="3902717"/>
+            <a:ext cx="1436040" cy="949790"/>
+          </a:xfrm>
+          <a:prstGeom prst="rect">
+            <a:avLst/>
+          </a:prstGeom>
+        </p:spPr>
+      </p:pic>
+      <p:pic>
+        <p:nvPicPr>
+          <p:cNvPr id="10" name="Picture 9">
+            <a:extLst>
+              <a:ext uri="{FF2B5EF4-FFF2-40B4-BE49-F238E27FC236}">
+                <a16:creationId xmlns:a16="http://schemas.microsoft.com/office/drawing/2014/main" id="{856F8F31-2DA1-643F-E581-7C23B0C0F857}"/>
+              </a:ext>
+            </a:extLst>
+          </p:cNvPr>
+          <p:cNvPicPr>
+            <a:picLocks noChangeAspect="1"/>
+          </p:cNvPicPr>
+          <p:nvPr/>
+        </p:nvPicPr>
+        <p:blipFill>
+          <a:blip r:embed="rId4">
+            <a:extLst>
+              <a:ext uri="{28A0092B-C50C-407E-A947-70E740481C1C}">
+                <a14:useLocalDpi xmlns:a14="http://schemas.microsoft.com/office/drawing/2010/main" val="0"/>
+              </a:ext>
+            </a:extLst>
+          </a:blip>
+          <a:stretch>
+            <a:fillRect/>
+          </a:stretch>
+        </p:blipFill>
+        <p:spPr>
+          <a:xfrm>
+            <a:off x="3899421" y="2745214"/>
+            <a:ext cx="1436040" cy="949790"/>
+          </a:xfrm>
+          <a:prstGeom prst="rect">
+            <a:avLst/>
+          </a:prstGeom>
+        </p:spPr>
+      </p:pic>
+      <p:pic>
+        <p:nvPicPr>
+          <p:cNvPr id="11" name="Picture 10">
+            <a:extLst>
+              <a:ext uri="{FF2B5EF4-FFF2-40B4-BE49-F238E27FC236}">
+                <a16:creationId xmlns:a16="http://schemas.microsoft.com/office/drawing/2014/main" id="{3677D26C-33B2-BAA4-9943-CDA4BD0652AF}"/>
+              </a:ext>
+            </a:extLst>
+          </p:cNvPr>
+          <p:cNvPicPr>
+            <a:picLocks noChangeAspect="1"/>
+          </p:cNvPicPr>
+          <p:nvPr/>
+        </p:nvPicPr>
+        <p:blipFill>
+          <a:blip r:embed="rId4">
+            <a:extLst>
+              <a:ext uri="{28A0092B-C50C-407E-A947-70E740481C1C}">
+                <a14:useLocalDpi xmlns:a14="http://schemas.microsoft.com/office/drawing/2010/main" val="0"/>
+              </a:ext>
+            </a:extLst>
+          </a:blip>
+          <a:stretch>
+            <a:fillRect/>
+          </a:stretch>
+        </p:blipFill>
+        <p:spPr>
+          <a:xfrm>
+            <a:off x="3907485" y="3902717"/>
+            <a:ext cx="1436040" cy="949790"/>
+          </a:xfrm>
+          <a:prstGeom prst="rect">
+            <a:avLst/>
+          </a:prstGeom>
+        </p:spPr>
+      </p:pic>
+    </p:spTree>
+    <p:extLst>
+      <p:ext uri="{BB962C8B-B14F-4D97-AF65-F5344CB8AC3E}">
+        <p14:creationId xmlns:p14="http://schemas.microsoft.com/office/powerpoint/2010/main" val="3528379071"/>
+      </p:ext>
+    </p:extLst>
+  </p:cSld>
+  <p:clrMapOvr>
+    <a:masterClrMapping/>
+  </p:clrMapOvr>
+</p:sld>
+</file>
+
+<file path=ppt/slides/slide12.xml><?xml version="1.0" encoding="utf-8"?>
+<p:sld xmlns:a="http://schemas.openxmlformats.org/drawingml/2006/main" xmlns:r="http://schemas.openxmlformats.org/officeDocument/2006/relationships" xmlns:p="http://schemas.openxmlformats.org/presentationml/2006/main">
+  <p:cSld>
+    <p:spTree>
+      <p:nvGrpSpPr>
+        <p:cNvPr id="1" name=""/>
+        <p:cNvGrpSpPr/>
+        <p:nvPr/>
+      </p:nvGrpSpPr>
+      <p:grpSpPr>
+        <a:xfrm>
+          <a:off x="0" y="0"/>
+          <a:ext cx="0" cy="0"/>
+          <a:chOff x="0" y="0"/>
+          <a:chExt cx="0" cy="0"/>
+        </a:xfrm>
+      </p:grpSpPr>
+      <p:pic>
+        <p:nvPicPr>
+          <p:cNvPr id="5122" name="Picture 2" descr="No description available.">
+            <a:extLst>
+              <a:ext uri="{FF2B5EF4-FFF2-40B4-BE49-F238E27FC236}">
+                <a16:creationId xmlns:a16="http://schemas.microsoft.com/office/drawing/2014/main" id="{85324884-C555-6EF4-E63B-F30C3A105CF8}"/>
+              </a:ext>
+            </a:extLst>
+          </p:cNvPr>
+          <p:cNvPicPr>
+            <a:picLocks noChangeAspect="1" noChangeArrowheads="1"/>
+          </p:cNvPicPr>
+          <p:nvPr/>
+        </p:nvPicPr>
+        <p:blipFill>
+          <a:blip r:embed="rId2">
+            <a:extLst>
+              <a:ext uri="{28A0092B-C50C-407E-A947-70E740481C1C}">
+                <a14:useLocalDpi xmlns:a14="http://schemas.microsoft.com/office/drawing/2010/main" val="0"/>
+              </a:ext>
+            </a:extLst>
+          </a:blip>
+          <a:srcRect/>
+          <a:stretch>
+            <a:fillRect/>
+          </a:stretch>
+        </p:blipFill>
+        <p:spPr bwMode="auto">
+          <a:xfrm>
+            <a:off x="239486" y="1299871"/>
+            <a:ext cx="5856514" cy="3526970"/>
+          </a:xfrm>
+          <a:prstGeom prst="rect">
+            <a:avLst/>
+          </a:prstGeom>
+          <a:noFill/>
+          <a:extLst>
+            <a:ext uri="{909E8E84-426E-40DD-AFC4-6F175D3DCCD1}">
+              <a14:hiddenFill xmlns:a14="http://schemas.microsoft.com/office/drawing/2010/main">
+                <a:solidFill>
+                  <a:srgbClr val="FFFFFF"/>
+                </a:solidFill>
+              </a14:hiddenFill>
+            </a:ext>
+          </a:extLst>
+        </p:spPr>
+      </p:pic>
+      <p:sp>
+        <p:nvSpPr>
+          <p:cNvPr id="2" name="Title 1">
+            <a:extLst>
+              <a:ext uri="{FF2B5EF4-FFF2-40B4-BE49-F238E27FC236}">
+                <a16:creationId xmlns:a16="http://schemas.microsoft.com/office/drawing/2014/main" id="{EA8D4FC8-AA75-74EE-145E-F53C8F5E0817}"/>
+              </a:ext>
+            </a:extLst>
+          </p:cNvPr>
+          <p:cNvSpPr txBox="1">
+            <a:spLocks/>
+          </p:cNvSpPr>
+          <p:nvPr/>
+        </p:nvSpPr>
+        <p:spPr>
+          <a:xfrm>
+            <a:off x="2835014" y="4444084"/>
+            <a:ext cx="665458" cy="112066"/>
+          </a:xfrm>
+          <a:prstGeom prst="rect">
+            <a:avLst/>
+          </a:prstGeom>
+        </p:spPr>
+        <p:txBody>
+          <a:bodyPr/>
+          <a:lstStyle>
+            <a:lvl1pPr algn="l" defTabSz="914400" rtl="0" eaLnBrk="1" latinLnBrk="0" hangingPunct="1">
+              <a:lnSpc>
+                <a:spcPct val="90000"/>
+              </a:lnSpc>
+              <a:spcBef>
+                <a:spcPct val="0"/>
+              </a:spcBef>
+              <a:buNone/>
+              <a:defRPr sz="4700" i="0" kern="1200" spc="-50" baseline="0">
+                <a:solidFill>
+                  <a:schemeClr val="tx1">
+                    <a:lumMod val="75000"/>
+                    <a:lumOff val="25000"/>
+                  </a:schemeClr>
+                </a:solidFill>
+                <a:latin typeface="+mj-lt"/>
+                <a:ea typeface="+mj-ea"/>
+                <a:cs typeface="+mj-cs"/>
+              </a:defRPr>
+            </a:lvl1pPr>
+          </a:lstStyle>
+          <a:p>
+            <a:pPr algn="ctr"/>
+            <a:r>
+              <a:rPr lang="en-PH" sz="1100" dirty="0">
+                <a:solidFill>
+                  <a:srgbClr val="21B9A0"/>
+                </a:solidFill>
+              </a:rPr>
+              <a:t>Browse</a:t>
+            </a:r>
+            <a:endParaRPr lang="en-PH" sz="1400" dirty="0">
+              <a:solidFill>
+                <a:srgbClr val="21B9A0"/>
+              </a:solidFill>
+            </a:endParaRPr>
+          </a:p>
+        </p:txBody>
+      </p:sp>
+      <p:pic>
+        <p:nvPicPr>
+          <p:cNvPr id="5124" name="Picture 4" descr="No description available.">
+            <a:extLst>
+              <a:ext uri="{FF2B5EF4-FFF2-40B4-BE49-F238E27FC236}">
+                <a16:creationId xmlns:a16="http://schemas.microsoft.com/office/drawing/2014/main" id="{D38FB8D3-4E30-1069-7B1B-F33DF091BC3B}"/>
+              </a:ext>
+            </a:extLst>
+          </p:cNvPr>
+          <p:cNvPicPr>
+            <a:picLocks noChangeAspect="1" noChangeArrowheads="1"/>
+          </p:cNvPicPr>
+          <p:nvPr/>
+        </p:nvPicPr>
+        <p:blipFill>
+          <a:blip r:embed="rId3">
+            <a:extLst>
+              <a:ext uri="{28A0092B-C50C-407E-A947-70E740481C1C}">
+                <a14:useLocalDpi xmlns:a14="http://schemas.microsoft.com/office/drawing/2010/main" val="0"/>
+              </a:ext>
+            </a:extLst>
+          </a:blip>
+          <a:srcRect/>
+          <a:stretch>
+            <a:fillRect/>
+          </a:stretch>
+        </p:blipFill>
+        <p:spPr bwMode="auto">
+          <a:xfrm>
+            <a:off x="6346216" y="1299870"/>
+            <a:ext cx="5401025" cy="3526971"/>
+          </a:xfrm>
+          <a:prstGeom prst="rect">
+            <a:avLst/>
+          </a:prstGeom>
+          <a:noFill/>
+          <a:extLst>
+            <a:ext uri="{909E8E84-426E-40DD-AFC4-6F175D3DCCD1}">
+              <a14:hiddenFill xmlns:a14="http://schemas.microsoft.com/office/drawing/2010/main">
+                <a:solidFill>
+                  <a:srgbClr val="FFFFFF"/>
+                </a:solidFill>
+              </a14:hiddenFill>
+            </a:ext>
+          </a:extLst>
+        </p:spPr>
+      </p:pic>
+      <p:sp>
+        <p:nvSpPr>
+          <p:cNvPr id="4" name="TextBox 3">
+            <a:extLst>
+              <a:ext uri="{FF2B5EF4-FFF2-40B4-BE49-F238E27FC236}">
+                <a16:creationId xmlns:a16="http://schemas.microsoft.com/office/drawing/2014/main" id="{6319A9A4-6571-44DF-8BFE-B9CD8B849890}"/>
+              </a:ext>
+            </a:extLst>
+          </p:cNvPr>
+          <p:cNvSpPr txBox="1"/>
+          <p:nvPr/>
+        </p:nvSpPr>
+        <p:spPr>
+          <a:xfrm>
+            <a:off x="8961003" y="3515118"/>
+            <a:ext cx="764022" cy="276999"/>
+          </a:xfrm>
+          <a:prstGeom prst="rect">
+            <a:avLst/>
+          </a:prstGeom>
+          <a:noFill/>
+        </p:spPr>
+        <p:txBody>
+          <a:bodyPr wrap="square">
+            <a:spAutoFit/>
+          </a:bodyPr>
+          <a:lstStyle/>
+          <a:p>
+            <a:r>
+              <a:rPr lang="en-PH" sz="1200" dirty="0">
+                <a:solidFill>
+                  <a:srgbClr val="21B9A0"/>
+                </a:solidFill>
+              </a:rPr>
+              <a:t>Book</a:t>
+            </a:r>
+            <a:endParaRPr lang="en-PH" sz="1200" dirty="0"/>
+          </a:p>
+        </p:txBody>
+      </p:sp>
+      <p:sp>
+        <p:nvSpPr>
+          <p:cNvPr id="5" name="Title 1">
+            <a:extLst>
+              <a:ext uri="{FF2B5EF4-FFF2-40B4-BE49-F238E27FC236}">
+                <a16:creationId xmlns:a16="http://schemas.microsoft.com/office/drawing/2014/main" id="{D6BBB69E-21D9-10FB-1487-4F1D12DDE9E9}"/>
+              </a:ext>
+            </a:extLst>
+          </p:cNvPr>
+          <p:cNvSpPr txBox="1">
+            <a:spLocks/>
+          </p:cNvSpPr>
+          <p:nvPr/>
+        </p:nvSpPr>
+        <p:spPr>
+          <a:xfrm>
+            <a:off x="-172188" y="863579"/>
+            <a:ext cx="2588000" cy="436291"/>
+          </a:xfrm>
+          <a:prstGeom prst="rect">
+            <a:avLst/>
+          </a:prstGeom>
+        </p:spPr>
+        <p:txBody>
+          <a:bodyPr/>
+          <a:lstStyle>
+            <a:lvl1pPr algn="l" defTabSz="914400" rtl="0" eaLnBrk="1" latinLnBrk="0" hangingPunct="1">
+              <a:lnSpc>
+                <a:spcPct val="90000"/>
+              </a:lnSpc>
+              <a:spcBef>
+                <a:spcPct val="0"/>
+              </a:spcBef>
+              <a:buNone/>
+              <a:defRPr sz="4700" i="0" kern="1200" spc="-50" baseline="0">
+                <a:solidFill>
+                  <a:schemeClr val="tx1">
+                    <a:lumMod val="75000"/>
+                    <a:lumOff val="25000"/>
+                  </a:schemeClr>
+                </a:solidFill>
+                <a:latin typeface="+mj-lt"/>
+                <a:ea typeface="+mj-ea"/>
+                <a:cs typeface="+mj-cs"/>
+              </a:defRPr>
+            </a:lvl1pPr>
+          </a:lstStyle>
+          <a:p>
+            <a:pPr algn="ctr"/>
+            <a:r>
+              <a:rPr lang="en-PH" sz="1400" dirty="0">
+                <a:solidFill>
+                  <a:srgbClr val="21B9A0"/>
+                </a:solidFill>
+              </a:rPr>
+              <a:t>Featured</a:t>
+            </a:r>
+          </a:p>
+        </p:txBody>
+      </p:sp>
+      <p:sp>
+        <p:nvSpPr>
+          <p:cNvPr id="6" name="Title 1">
+            <a:extLst>
+              <a:ext uri="{FF2B5EF4-FFF2-40B4-BE49-F238E27FC236}">
+                <a16:creationId xmlns:a16="http://schemas.microsoft.com/office/drawing/2014/main" id="{4C6BF924-61FF-301C-AB0F-1D6E8902688D}"/>
+              </a:ext>
+            </a:extLst>
+          </p:cNvPr>
+          <p:cNvSpPr txBox="1">
+            <a:spLocks/>
+          </p:cNvSpPr>
+          <p:nvPr/>
+        </p:nvSpPr>
+        <p:spPr>
+          <a:xfrm>
+            <a:off x="6228612" y="863578"/>
+            <a:ext cx="2588000" cy="436291"/>
+          </a:xfrm>
+          <a:prstGeom prst="rect">
+            <a:avLst/>
+          </a:prstGeom>
+        </p:spPr>
+        <p:txBody>
+          <a:bodyPr/>
+          <a:lstStyle>
+            <a:lvl1pPr algn="l" defTabSz="914400" rtl="0" eaLnBrk="1" latinLnBrk="0" hangingPunct="1">
+              <a:lnSpc>
+                <a:spcPct val="90000"/>
+              </a:lnSpc>
+              <a:spcBef>
+                <a:spcPct val="0"/>
+              </a:spcBef>
+              <a:buNone/>
+              <a:defRPr sz="4700" i="0" kern="1200" spc="-50" baseline="0">
+                <a:solidFill>
+                  <a:schemeClr val="tx1">
+                    <a:lumMod val="75000"/>
+                    <a:lumOff val="25000"/>
+                  </a:schemeClr>
+                </a:solidFill>
+                <a:latin typeface="+mj-lt"/>
+                <a:ea typeface="+mj-ea"/>
+                <a:cs typeface="+mj-cs"/>
+              </a:defRPr>
+            </a:lvl1pPr>
+          </a:lstStyle>
+          <a:p>
+            <a:pPr algn="ctr"/>
+            <a:r>
+              <a:rPr lang="en-PH" sz="1400" dirty="0">
+                <a:solidFill>
+                  <a:srgbClr val="21B9A0"/>
+                </a:solidFill>
+              </a:rPr>
+              <a:t>Book an appointment</a:t>
+            </a:r>
+          </a:p>
+        </p:txBody>
+      </p:sp>
+      <p:pic>
+        <p:nvPicPr>
+          <p:cNvPr id="8" name="Picture 7">
+            <a:extLst>
+              <a:ext uri="{FF2B5EF4-FFF2-40B4-BE49-F238E27FC236}">
+                <a16:creationId xmlns:a16="http://schemas.microsoft.com/office/drawing/2014/main" id="{F467C24C-B785-CEB2-E7B1-A6E8FD0E9034}"/>
+              </a:ext>
+            </a:extLst>
+          </p:cNvPr>
+          <p:cNvPicPr>
+            <a:picLocks noChangeAspect="1"/>
+          </p:cNvPicPr>
+          <p:nvPr/>
+        </p:nvPicPr>
+        <p:blipFill>
+          <a:blip r:embed="rId4">
+            <a:extLst>
+              <a:ext uri="{28A0092B-C50C-407E-A947-70E740481C1C}">
+                <a14:useLocalDpi xmlns:a14="http://schemas.microsoft.com/office/drawing/2010/main" val="0"/>
+              </a:ext>
+            </a:extLst>
+          </a:blip>
+          <a:stretch>
+            <a:fillRect/>
+          </a:stretch>
+        </p:blipFill>
+        <p:spPr>
+          <a:xfrm>
+            <a:off x="6586712" y="2009775"/>
+            <a:ext cx="2124075" cy="2124075"/>
+          </a:xfrm>
+          <a:prstGeom prst="rect">
+            <a:avLst/>
+          </a:prstGeom>
+        </p:spPr>
+      </p:pic>
+    </p:spTree>
+    <p:extLst>
+      <p:ext uri="{BB962C8B-B14F-4D97-AF65-F5344CB8AC3E}">
+        <p14:creationId xmlns:p14="http://schemas.microsoft.com/office/powerpoint/2010/main" val="1596331610"/>
+      </p:ext>
+    </p:extLst>
+  </p:cSld>
+  <p:clrMapOvr>
+    <a:masterClrMapping/>
+  </p:clrMapOvr>
+</p:sld>
+</file>
+
+<file path=ppt/slides/slide13.xml><?xml version="1.0" encoding="utf-8"?>
+<p:sld xmlns:a="http://schemas.openxmlformats.org/drawingml/2006/main" xmlns:r="http://schemas.openxmlformats.org/officeDocument/2006/relationships" xmlns:p="http://schemas.openxmlformats.org/presentationml/2006/main">
+  <p:cSld>
+    <p:spTree>
+      <p:nvGrpSpPr>
+        <p:cNvPr id="1" name=""/>
+        <p:cNvGrpSpPr/>
+        <p:nvPr/>
+      </p:nvGrpSpPr>
+      <p:grpSpPr>
+        <a:xfrm>
+          <a:off x="0" y="0"/>
+          <a:ext cx="0" cy="0"/>
+          <a:chOff x="0" y="0"/>
+          <a:chExt cx="0" cy="0"/>
+        </a:xfrm>
+      </p:grpSpPr>
+      <p:pic>
+        <p:nvPicPr>
+          <p:cNvPr id="6146" name="Picture 2" descr="No description available.">
+            <a:extLst>
+              <a:ext uri="{FF2B5EF4-FFF2-40B4-BE49-F238E27FC236}">
+                <a16:creationId xmlns:a16="http://schemas.microsoft.com/office/drawing/2014/main" id="{A9AF586D-EDE3-968E-89CE-745E4EB955D1}"/>
+              </a:ext>
+            </a:extLst>
+          </p:cNvPr>
+          <p:cNvPicPr>
+            <a:picLocks noChangeAspect="1" noChangeArrowheads="1"/>
+          </p:cNvPicPr>
+          <p:nvPr/>
+        </p:nvPicPr>
+        <p:blipFill>
+          <a:blip r:embed="rId2">
+            <a:extLst>
+              <a:ext uri="{28A0092B-C50C-407E-A947-70E740481C1C}">
+                <a14:useLocalDpi xmlns:a14="http://schemas.microsoft.com/office/drawing/2010/main" val="0"/>
+              </a:ext>
+            </a:extLst>
+          </a:blip>
+          <a:srcRect/>
+          <a:stretch>
+            <a:fillRect/>
+          </a:stretch>
+        </p:blipFill>
+        <p:spPr bwMode="auto">
+          <a:xfrm>
+            <a:off x="457200" y="1324947"/>
+            <a:ext cx="5747657" cy="3233057"/>
+          </a:xfrm>
+          <a:prstGeom prst="rect">
+            <a:avLst/>
+          </a:prstGeom>
+          <a:noFill/>
+          <a:extLst>
+            <a:ext uri="{909E8E84-426E-40DD-AFC4-6F175D3DCCD1}">
+              <a14:hiddenFill xmlns:a14="http://schemas.microsoft.com/office/drawing/2010/main">
+                <a:solidFill>
+                  <a:srgbClr val="FFFFFF"/>
+                </a:solidFill>
+              </a14:hiddenFill>
+            </a:ext>
+          </a:extLst>
+        </p:spPr>
+      </p:pic>
+      <p:sp>
+        <p:nvSpPr>
+          <p:cNvPr id="2" name="Title 1">
+            <a:extLst>
+              <a:ext uri="{FF2B5EF4-FFF2-40B4-BE49-F238E27FC236}">
+                <a16:creationId xmlns:a16="http://schemas.microsoft.com/office/drawing/2014/main" id="{134C9EA5-C06C-483B-2C22-35FE99D93B57}"/>
+              </a:ext>
+            </a:extLst>
+          </p:cNvPr>
+          <p:cNvSpPr txBox="1">
+            <a:spLocks/>
+          </p:cNvSpPr>
+          <p:nvPr/>
+        </p:nvSpPr>
+        <p:spPr>
+          <a:xfrm>
+            <a:off x="2037028" y="1572706"/>
+            <a:ext cx="2588000" cy="436291"/>
+          </a:xfrm>
+          <a:prstGeom prst="rect">
+            <a:avLst/>
+          </a:prstGeom>
+        </p:spPr>
+        <p:txBody>
+          <a:bodyPr/>
+          <a:lstStyle>
+            <a:lvl1pPr algn="l" defTabSz="914400" rtl="0" eaLnBrk="1" latinLnBrk="0" hangingPunct="1">
+              <a:lnSpc>
+                <a:spcPct val="90000"/>
+              </a:lnSpc>
+              <a:spcBef>
+                <a:spcPct val="0"/>
+              </a:spcBef>
+              <a:buNone/>
+              <a:defRPr sz="4700" i="0" kern="1200" spc="-50" baseline="0">
+                <a:solidFill>
+                  <a:schemeClr val="tx1">
+                    <a:lumMod val="75000"/>
+                    <a:lumOff val="25000"/>
+                  </a:schemeClr>
+                </a:solidFill>
+                <a:latin typeface="+mj-lt"/>
+                <a:ea typeface="+mj-ea"/>
+                <a:cs typeface="+mj-cs"/>
+              </a:defRPr>
+            </a:lvl1pPr>
+          </a:lstStyle>
+          <a:p>
+            <a:pPr algn="ctr"/>
+            <a:r>
+              <a:rPr lang="en-PH" sz="1400" dirty="0">
+                <a:solidFill>
+                  <a:srgbClr val="21B9A0"/>
+                </a:solidFill>
+              </a:rPr>
+              <a:t>Agents</a:t>
+            </a:r>
+          </a:p>
+        </p:txBody>
+      </p:sp>
+      <p:pic>
+        <p:nvPicPr>
+          <p:cNvPr id="6148" name="Picture 4" descr="No description available.">
+            <a:extLst>
+              <a:ext uri="{FF2B5EF4-FFF2-40B4-BE49-F238E27FC236}">
+                <a16:creationId xmlns:a16="http://schemas.microsoft.com/office/drawing/2014/main" id="{2A281749-09A7-8FB8-F4B0-7329DAEDB2FE}"/>
+              </a:ext>
+            </a:extLst>
+          </p:cNvPr>
+          <p:cNvPicPr>
+            <a:picLocks noChangeAspect="1" noChangeArrowheads="1"/>
+          </p:cNvPicPr>
+          <p:nvPr/>
+        </p:nvPicPr>
+        <p:blipFill>
+          <a:blip r:embed="rId3">
+            <a:extLst>
+              <a:ext uri="{28A0092B-C50C-407E-A947-70E740481C1C}">
+                <a14:useLocalDpi xmlns:a14="http://schemas.microsoft.com/office/drawing/2010/main" val="0"/>
+              </a:ext>
+            </a:extLst>
+          </a:blip>
+          <a:srcRect/>
+          <a:stretch>
+            <a:fillRect/>
+          </a:stretch>
+        </p:blipFill>
+        <p:spPr bwMode="auto">
+          <a:xfrm>
+            <a:off x="6512768" y="1324947"/>
+            <a:ext cx="5222032" cy="3233056"/>
+          </a:xfrm>
+          <a:prstGeom prst="rect">
+            <a:avLst/>
+          </a:prstGeom>
+          <a:noFill/>
+          <a:extLst>
+            <a:ext uri="{909E8E84-426E-40DD-AFC4-6F175D3DCCD1}">
+              <a14:hiddenFill xmlns:a14="http://schemas.microsoft.com/office/drawing/2010/main">
+                <a:solidFill>
+                  <a:srgbClr val="FFFFFF"/>
+                </a:solidFill>
+              </a14:hiddenFill>
+            </a:ext>
+          </a:extLst>
+        </p:spPr>
+      </p:pic>
+      <p:sp>
+        <p:nvSpPr>
+          <p:cNvPr id="3" name="Title 1">
+            <a:extLst>
+              <a:ext uri="{FF2B5EF4-FFF2-40B4-BE49-F238E27FC236}">
+                <a16:creationId xmlns:a16="http://schemas.microsoft.com/office/drawing/2014/main" id="{C827051C-F73C-B835-BFFF-3A8978BC362D}"/>
+              </a:ext>
+            </a:extLst>
+          </p:cNvPr>
+          <p:cNvSpPr txBox="1">
+            <a:spLocks/>
+          </p:cNvSpPr>
+          <p:nvPr/>
+        </p:nvSpPr>
+        <p:spPr>
+          <a:xfrm>
+            <a:off x="7829784" y="1596530"/>
+            <a:ext cx="2588000" cy="436291"/>
+          </a:xfrm>
+          <a:prstGeom prst="rect">
+            <a:avLst/>
+          </a:prstGeom>
+        </p:spPr>
+        <p:txBody>
+          <a:bodyPr/>
+          <a:lstStyle>
+            <a:lvl1pPr algn="l" defTabSz="914400" rtl="0" eaLnBrk="1" latinLnBrk="0" hangingPunct="1">
+              <a:lnSpc>
+                <a:spcPct val="90000"/>
+              </a:lnSpc>
+              <a:spcBef>
+                <a:spcPct val="0"/>
+              </a:spcBef>
+              <a:buNone/>
+              <a:defRPr sz="4700" i="0" kern="1200" spc="-50" baseline="0">
+                <a:solidFill>
+                  <a:schemeClr val="tx1">
+                    <a:lumMod val="75000"/>
+                    <a:lumOff val="25000"/>
+                  </a:schemeClr>
+                </a:solidFill>
+                <a:latin typeface="+mj-lt"/>
+                <a:ea typeface="+mj-ea"/>
+                <a:cs typeface="+mj-cs"/>
+              </a:defRPr>
+            </a:lvl1pPr>
+          </a:lstStyle>
+          <a:p>
+            <a:pPr algn="ctr"/>
+            <a:r>
+              <a:rPr lang="en-PH" sz="1400" dirty="0">
+                <a:solidFill>
+                  <a:srgbClr val="21B9A0"/>
+                </a:solidFill>
+              </a:rPr>
+              <a:t>Testimonial</a:t>
+            </a:r>
+          </a:p>
+        </p:txBody>
+      </p:sp>
+    </p:spTree>
+    <p:extLst>
+      <p:ext uri="{BB962C8B-B14F-4D97-AF65-F5344CB8AC3E}">
+        <p14:creationId xmlns:p14="http://schemas.microsoft.com/office/powerpoint/2010/main" val="1354048617"/>
+      </p:ext>
+    </p:extLst>
+  </p:cSld>
+  <p:clrMapOvr>
+    <a:masterClrMapping/>
+  </p:clrMapOvr>
+</p:sld>
+</file>
+
+<file path=ppt/slides/slide14.xml><?xml version="1.0" encoding="utf-8"?>
+<p:sld xmlns:a="http://schemas.openxmlformats.org/drawingml/2006/main" xmlns:r="http://schemas.openxmlformats.org/officeDocument/2006/relationships" xmlns:p="http://schemas.openxmlformats.org/presentationml/2006/main">
+  <p:cSld>
+    <p:spTree>
+      <p:nvGrpSpPr>
+        <p:cNvPr id="1" name=""/>
+        <p:cNvGrpSpPr/>
+        <p:nvPr/>
+      </p:nvGrpSpPr>
+      <p:grpSpPr>
+        <a:xfrm>
+          <a:off x="0" y="0"/>
+          <a:ext cx="0" cy="0"/>
+          <a:chOff x="0" y="0"/>
+          <a:chExt cx="0" cy="0"/>
+        </a:xfrm>
+      </p:grpSpPr>
+      <p:pic>
+        <p:nvPicPr>
+          <p:cNvPr id="7170" name="Picture 2" descr="No description available.">
+            <a:extLst>
+              <a:ext uri="{FF2B5EF4-FFF2-40B4-BE49-F238E27FC236}">
+                <a16:creationId xmlns:a16="http://schemas.microsoft.com/office/drawing/2014/main" id="{5DC46F8B-A141-AFC2-2735-8A5DE0F6933D}"/>
+              </a:ext>
+            </a:extLst>
+          </p:cNvPr>
+          <p:cNvPicPr>
+            <a:picLocks noChangeAspect="1" noChangeArrowheads="1"/>
+          </p:cNvPicPr>
+          <p:nvPr/>
+        </p:nvPicPr>
+        <p:blipFill>
+          <a:blip r:embed="rId2">
+            <a:extLst>
+              <a:ext uri="{28A0092B-C50C-407E-A947-70E740481C1C}">
+                <a14:useLocalDpi xmlns:a14="http://schemas.microsoft.com/office/drawing/2010/main" val="0"/>
+              </a:ext>
+            </a:extLst>
+          </a:blip>
+          <a:srcRect/>
+          <a:stretch>
+            <a:fillRect/>
+          </a:stretch>
+        </p:blipFill>
+        <p:spPr bwMode="auto">
+          <a:xfrm>
+            <a:off x="2425959" y="1661433"/>
+            <a:ext cx="6792686" cy="2975882"/>
+          </a:xfrm>
+          <a:prstGeom prst="rect">
+            <a:avLst/>
+          </a:prstGeom>
+          <a:noFill/>
+          <a:extLst>
+            <a:ext uri="{909E8E84-426E-40DD-AFC4-6F175D3DCCD1}">
+              <a14:hiddenFill xmlns:a14="http://schemas.microsoft.com/office/drawing/2010/main">
+                <a:solidFill>
+                  <a:srgbClr val="FFFFFF"/>
+                </a:solidFill>
+              </a14:hiddenFill>
+            </a:ext>
+          </a:extLst>
+        </p:spPr>
+      </p:pic>
+      <p:sp>
+        <p:nvSpPr>
+          <p:cNvPr id="2" name="Title 1">
+            <a:extLst>
+              <a:ext uri="{FF2B5EF4-FFF2-40B4-BE49-F238E27FC236}">
+                <a16:creationId xmlns:a16="http://schemas.microsoft.com/office/drawing/2014/main" id="{0CF028EC-F3BB-200C-BB1E-F1E8E2D4DEDD}"/>
+              </a:ext>
+            </a:extLst>
+          </p:cNvPr>
+          <p:cNvSpPr txBox="1">
+            <a:spLocks/>
+          </p:cNvSpPr>
+          <p:nvPr/>
+        </p:nvSpPr>
+        <p:spPr>
+          <a:xfrm>
+            <a:off x="1533174" y="1165453"/>
+            <a:ext cx="3458703" cy="730703"/>
+          </a:xfrm>
+          <a:prstGeom prst="rect">
+            <a:avLst/>
+          </a:prstGeom>
+        </p:spPr>
+        <p:txBody>
+          <a:bodyPr/>
+          <a:lstStyle>
+            <a:lvl1pPr algn="l" defTabSz="914400" rtl="0" eaLnBrk="1" latinLnBrk="0" hangingPunct="1">
+              <a:lnSpc>
+                <a:spcPct val="90000"/>
+              </a:lnSpc>
+              <a:spcBef>
+                <a:spcPct val="0"/>
+              </a:spcBef>
+              <a:buNone/>
+              <a:defRPr sz="4700" i="0" kern="1200" spc="-50" baseline="0">
+                <a:solidFill>
+                  <a:schemeClr val="tx1">
+                    <a:lumMod val="75000"/>
+                    <a:lumOff val="25000"/>
+                  </a:schemeClr>
+                </a:solidFill>
+                <a:latin typeface="+mj-lt"/>
+                <a:ea typeface="+mj-ea"/>
+                <a:cs typeface="+mj-cs"/>
+              </a:defRPr>
+            </a:lvl1pPr>
+          </a:lstStyle>
+          <a:p>
+            <a:pPr algn="ctr"/>
+            <a:r>
+              <a:rPr lang="en-PH" sz="2800" dirty="0">
+                <a:solidFill>
+                  <a:srgbClr val="21B9A0"/>
+                </a:solidFill>
+              </a:rPr>
+              <a:t>Agents</a:t>
+            </a:r>
+          </a:p>
+        </p:txBody>
+      </p:sp>
+    </p:spTree>
+    <p:extLst>
+      <p:ext uri="{BB962C8B-B14F-4D97-AF65-F5344CB8AC3E}">
+        <p14:creationId xmlns:p14="http://schemas.microsoft.com/office/powerpoint/2010/main" val="4171020134"/>
+      </p:ext>
+    </p:extLst>
+  </p:cSld>
+  <p:clrMapOvr>
+    <a:masterClrMapping/>
+  </p:clrMapOvr>
+</p:sld>
+</file>
+
 <file path=ppt/slides/slide2.xml><?xml version="1.0" encoding="utf-8"?>
 <p:sld xmlns:a="http://schemas.openxmlformats.org/drawingml/2006/main" xmlns:r="http://schemas.openxmlformats.org/officeDocument/2006/relationships" xmlns:p="http://schemas.openxmlformats.org/presentationml/2006/main">
   <p:cSld>
@@ -5817,6 +7597,480 @@
           <p:cNvPr id="2" name="Title 1">
             <a:extLst>
               <a:ext uri="{FF2B5EF4-FFF2-40B4-BE49-F238E27FC236}">
+                <a16:creationId xmlns:a16="http://schemas.microsoft.com/office/drawing/2014/main" id="{809A4BDA-51F9-9295-413C-C851CC23F099}"/>
+              </a:ext>
+            </a:extLst>
+          </p:cNvPr>
+          <p:cNvSpPr txBox="1">
+            <a:spLocks/>
+          </p:cNvSpPr>
+          <p:nvPr/>
+        </p:nvSpPr>
+        <p:spPr>
+          <a:xfrm>
+            <a:off x="406816" y="454708"/>
+            <a:ext cx="8503919" cy="1056852"/>
+          </a:xfrm>
+          <a:prstGeom prst="rect">
+            <a:avLst/>
+          </a:prstGeom>
+        </p:spPr>
+        <p:txBody>
+          <a:bodyPr/>
+          <a:lstStyle>
+            <a:lvl1pPr algn="l" defTabSz="914400" rtl="0" eaLnBrk="1" latinLnBrk="0" hangingPunct="1">
+              <a:lnSpc>
+                <a:spcPct val="90000"/>
+              </a:lnSpc>
+              <a:spcBef>
+                <a:spcPct val="0"/>
+              </a:spcBef>
+              <a:buNone/>
+              <a:defRPr sz="4700" i="0" kern="1200" spc="-50" baseline="0">
+                <a:solidFill>
+                  <a:schemeClr val="tx1">
+                    <a:lumMod val="75000"/>
+                    <a:lumOff val="25000"/>
+                  </a:schemeClr>
+                </a:solidFill>
+                <a:latin typeface="+mj-lt"/>
+                <a:ea typeface="+mj-ea"/>
+                <a:cs typeface="+mj-cs"/>
+              </a:defRPr>
+            </a:lvl1pPr>
+          </a:lstStyle>
+          <a:p>
+            <a:endParaRPr lang="en-PH" dirty="0">
+              <a:solidFill>
+                <a:srgbClr val="21B9A0"/>
+              </a:solidFill>
+            </a:endParaRPr>
+          </a:p>
+        </p:txBody>
+      </p:sp>
+      <p:sp>
+        <p:nvSpPr>
+          <p:cNvPr id="3" name="Title 1">
+            <a:extLst>
+              <a:ext uri="{FF2B5EF4-FFF2-40B4-BE49-F238E27FC236}">
+                <a16:creationId xmlns:a16="http://schemas.microsoft.com/office/drawing/2014/main" id="{93C48755-3706-76EE-29C2-F9E5C9AE586F}"/>
+              </a:ext>
+            </a:extLst>
+          </p:cNvPr>
+          <p:cNvSpPr txBox="1">
+            <a:spLocks/>
+          </p:cNvSpPr>
+          <p:nvPr/>
+        </p:nvSpPr>
+        <p:spPr>
+          <a:xfrm>
+            <a:off x="322841" y="380064"/>
+            <a:ext cx="6385869" cy="916891"/>
+          </a:xfrm>
+          <a:prstGeom prst="rect">
+            <a:avLst/>
+          </a:prstGeom>
+        </p:spPr>
+        <p:txBody>
+          <a:bodyPr/>
+          <a:lstStyle>
+            <a:lvl1pPr algn="l" defTabSz="914400" rtl="0" eaLnBrk="1" latinLnBrk="0" hangingPunct="1">
+              <a:lnSpc>
+                <a:spcPct val="90000"/>
+              </a:lnSpc>
+              <a:spcBef>
+                <a:spcPct val="0"/>
+              </a:spcBef>
+              <a:buNone/>
+              <a:defRPr sz="4700" i="0" kern="1200" spc="-50" baseline="0">
+                <a:solidFill>
+                  <a:schemeClr val="tx1">
+                    <a:lumMod val="75000"/>
+                    <a:lumOff val="25000"/>
+                  </a:schemeClr>
+                </a:solidFill>
+                <a:latin typeface="+mj-lt"/>
+                <a:ea typeface="+mj-ea"/>
+                <a:cs typeface="+mj-cs"/>
+              </a:defRPr>
+            </a:lvl1pPr>
+          </a:lstStyle>
+          <a:p>
+            <a:r>
+              <a:rPr lang="en-PH" dirty="0">
+                <a:solidFill>
+                  <a:srgbClr val="21B9A0"/>
+                </a:solidFill>
+              </a:rPr>
+              <a:t>Technology Used</a:t>
+            </a:r>
+          </a:p>
+        </p:txBody>
+      </p:sp>
+      <p:pic>
+        <p:nvPicPr>
+          <p:cNvPr id="4" name="Picture 2" descr="CSS - Wikipedia">
+            <a:extLst>
+              <a:ext uri="{FF2B5EF4-FFF2-40B4-BE49-F238E27FC236}">
+                <a16:creationId xmlns:a16="http://schemas.microsoft.com/office/drawing/2014/main" id="{BB54E388-7092-3DC0-8F20-293A11582878}"/>
+              </a:ext>
+            </a:extLst>
+          </p:cNvPr>
+          <p:cNvPicPr>
+            <a:picLocks noChangeAspect="1" noChangeArrowheads="1"/>
+          </p:cNvPicPr>
+          <p:nvPr/>
+        </p:nvPicPr>
+        <p:blipFill>
+          <a:blip r:embed="rId2">
+            <a:extLst>
+              <a:ext uri="{28A0092B-C50C-407E-A947-70E740481C1C}">
+                <a14:useLocalDpi xmlns:a14="http://schemas.microsoft.com/office/drawing/2010/main" val="0"/>
+              </a:ext>
+            </a:extLst>
+          </a:blip>
+          <a:srcRect/>
+          <a:stretch>
+            <a:fillRect/>
+          </a:stretch>
+        </p:blipFill>
+        <p:spPr bwMode="auto">
+          <a:xfrm>
+            <a:off x="3739957" y="1645339"/>
+            <a:ext cx="1128156" cy="1591651"/>
+          </a:xfrm>
+          <a:prstGeom prst="rect">
+            <a:avLst/>
+          </a:prstGeom>
+          <a:noFill/>
+          <a:extLst>
+            <a:ext uri="{909E8E84-426E-40DD-AFC4-6F175D3DCCD1}">
+              <a14:hiddenFill xmlns:a14="http://schemas.microsoft.com/office/drawing/2010/main">
+                <a:solidFill>
+                  <a:srgbClr val="FFFFFF"/>
+                </a:solidFill>
+              </a14:hiddenFill>
+            </a:ext>
+          </a:extLst>
+        </p:spPr>
+      </p:pic>
+      <p:pic>
+        <p:nvPicPr>
+          <p:cNvPr id="5" name="Picture 4" descr="HTML - Wikipedia">
+            <a:extLst>
+              <a:ext uri="{FF2B5EF4-FFF2-40B4-BE49-F238E27FC236}">
+                <a16:creationId xmlns:a16="http://schemas.microsoft.com/office/drawing/2014/main" id="{10983783-0219-6373-529A-DBACF1EE33B6}"/>
+              </a:ext>
+            </a:extLst>
+          </p:cNvPr>
+          <p:cNvPicPr>
+            <a:picLocks noChangeAspect="1" noChangeArrowheads="1"/>
+          </p:cNvPicPr>
+          <p:nvPr/>
+        </p:nvPicPr>
+        <p:blipFill>
+          <a:blip r:embed="rId3">
+            <a:extLst>
+              <a:ext uri="{28A0092B-C50C-407E-A947-70E740481C1C}">
+                <a14:useLocalDpi xmlns:a14="http://schemas.microsoft.com/office/drawing/2010/main" val="0"/>
+              </a:ext>
+            </a:extLst>
+          </a:blip>
+          <a:srcRect/>
+          <a:stretch>
+            <a:fillRect/>
+          </a:stretch>
+        </p:blipFill>
+        <p:spPr bwMode="auto">
+          <a:xfrm>
+            <a:off x="1099533" y="1681924"/>
+            <a:ext cx="1518480" cy="1518480"/>
+          </a:xfrm>
+          <a:prstGeom prst="rect">
+            <a:avLst/>
+          </a:prstGeom>
+          <a:noFill/>
+          <a:extLst>
+            <a:ext uri="{909E8E84-426E-40DD-AFC4-6F175D3DCCD1}">
+              <a14:hiddenFill xmlns:a14="http://schemas.microsoft.com/office/drawing/2010/main">
+                <a:solidFill>
+                  <a:srgbClr val="FFFFFF"/>
+                </a:solidFill>
+              </a14:hiddenFill>
+            </a:ext>
+          </a:extLst>
+        </p:spPr>
+      </p:pic>
+      <p:pic>
+        <p:nvPicPr>
+          <p:cNvPr id="6" name="Picture 6" descr="Brand guidelines · Bootstrap v5.0">
+            <a:extLst>
+              <a:ext uri="{FF2B5EF4-FFF2-40B4-BE49-F238E27FC236}">
+                <a16:creationId xmlns:a16="http://schemas.microsoft.com/office/drawing/2014/main" id="{4444CD79-01D3-6445-733F-38477F569218}"/>
+              </a:ext>
+            </a:extLst>
+          </p:cNvPr>
+          <p:cNvPicPr>
+            <a:picLocks noChangeAspect="1" noChangeArrowheads="1"/>
+          </p:cNvPicPr>
+          <p:nvPr/>
+        </p:nvPicPr>
+        <p:blipFill>
+          <a:blip r:embed="rId4">
+            <a:extLst>
+              <a:ext uri="{28A0092B-C50C-407E-A947-70E740481C1C}">
+                <a14:useLocalDpi xmlns:a14="http://schemas.microsoft.com/office/drawing/2010/main" val="0"/>
+              </a:ext>
+            </a:extLst>
+          </a:blip>
+          <a:srcRect/>
+          <a:stretch>
+            <a:fillRect/>
+          </a:stretch>
+        </p:blipFill>
+        <p:spPr bwMode="auto">
+          <a:xfrm>
+            <a:off x="6352204" y="1848146"/>
+            <a:ext cx="1643928" cy="1304705"/>
+          </a:xfrm>
+          <a:prstGeom prst="rect">
+            <a:avLst/>
+          </a:prstGeom>
+          <a:noFill/>
+          <a:extLst>
+            <a:ext uri="{909E8E84-426E-40DD-AFC4-6F175D3DCCD1}">
+              <a14:hiddenFill xmlns:a14="http://schemas.microsoft.com/office/drawing/2010/main">
+                <a:solidFill>
+                  <a:srgbClr val="FFFFFF"/>
+                </a:solidFill>
+              </a14:hiddenFill>
+            </a:ext>
+          </a:extLst>
+        </p:spPr>
+      </p:pic>
+      <p:pic>
+        <p:nvPicPr>
+          <p:cNvPr id="7" name="Picture 8" descr="Github Logo - Free social media icons">
+            <a:extLst>
+              <a:ext uri="{FF2B5EF4-FFF2-40B4-BE49-F238E27FC236}">
+                <a16:creationId xmlns:a16="http://schemas.microsoft.com/office/drawing/2014/main" id="{0D35A6E3-B8A2-E62F-40FA-78069DD3CF3E}"/>
+              </a:ext>
+            </a:extLst>
+          </p:cNvPr>
+          <p:cNvPicPr>
+            <a:picLocks noChangeAspect="1" noChangeArrowheads="1"/>
+          </p:cNvPicPr>
+          <p:nvPr/>
+        </p:nvPicPr>
+        <p:blipFill>
+          <a:blip r:embed="rId5">
+            <a:extLst>
+              <a:ext uri="{28A0092B-C50C-407E-A947-70E740481C1C}">
+                <a14:useLocalDpi xmlns:a14="http://schemas.microsoft.com/office/drawing/2010/main" val="0"/>
+              </a:ext>
+            </a:extLst>
+          </a:blip>
+          <a:srcRect/>
+          <a:stretch>
+            <a:fillRect/>
+          </a:stretch>
+        </p:blipFill>
+        <p:spPr bwMode="auto">
+          <a:xfrm>
+            <a:off x="5056711" y="3791115"/>
+            <a:ext cx="1384960" cy="1384960"/>
+          </a:xfrm>
+          <a:prstGeom prst="rect">
+            <a:avLst/>
+          </a:prstGeom>
+          <a:noFill/>
+          <a:extLst>
+            <a:ext uri="{909E8E84-426E-40DD-AFC4-6F175D3DCCD1}">
+              <a14:hiddenFill xmlns:a14="http://schemas.microsoft.com/office/drawing/2010/main">
+                <a:solidFill>
+                  <a:srgbClr val="FFFFFF"/>
+                </a:solidFill>
+              </a14:hiddenFill>
+            </a:ext>
+          </a:extLst>
+        </p:spPr>
+      </p:pic>
+      <p:pic>
+        <p:nvPicPr>
+          <p:cNvPr id="8" name="Picture 10" descr="JavaScript logo - download.">
+            <a:extLst>
+              <a:ext uri="{FF2B5EF4-FFF2-40B4-BE49-F238E27FC236}">
+                <a16:creationId xmlns:a16="http://schemas.microsoft.com/office/drawing/2014/main" id="{94699464-6B05-EC9E-653B-390201FE3B22}"/>
+              </a:ext>
+            </a:extLst>
+          </p:cNvPr>
+          <p:cNvPicPr>
+            <a:picLocks noChangeAspect="1" noChangeArrowheads="1"/>
+          </p:cNvPicPr>
+          <p:nvPr/>
+        </p:nvPicPr>
+        <p:blipFill>
+          <a:blip r:embed="rId6">
+            <a:extLst>
+              <a:ext uri="{28A0092B-C50C-407E-A947-70E740481C1C}">
+                <a14:useLocalDpi xmlns:a14="http://schemas.microsoft.com/office/drawing/2010/main" val="0"/>
+              </a:ext>
+            </a:extLst>
+          </a:blip>
+          <a:srcRect/>
+          <a:stretch>
+            <a:fillRect/>
+          </a:stretch>
+        </p:blipFill>
+        <p:spPr bwMode="auto">
+          <a:xfrm>
+            <a:off x="9118076" y="1818517"/>
+            <a:ext cx="1166061" cy="1320799"/>
+          </a:xfrm>
+          <a:prstGeom prst="rect">
+            <a:avLst/>
+          </a:prstGeom>
+          <a:noFill/>
+          <a:extLst>
+            <a:ext uri="{909E8E84-426E-40DD-AFC4-6F175D3DCCD1}">
+              <a14:hiddenFill xmlns:a14="http://schemas.microsoft.com/office/drawing/2010/main">
+                <a:solidFill>
+                  <a:srgbClr val="FFFFFF"/>
+                </a:solidFill>
+              </a14:hiddenFill>
+            </a:ext>
+          </a:extLst>
+        </p:spPr>
+      </p:pic>
+      <p:pic>
+        <p:nvPicPr>
+          <p:cNvPr id="9" name="Picture 12" descr="Explore the Photoshop family of apps | Adobe Photoshop">
+            <a:extLst>
+              <a:ext uri="{FF2B5EF4-FFF2-40B4-BE49-F238E27FC236}">
+                <a16:creationId xmlns:a16="http://schemas.microsoft.com/office/drawing/2014/main" id="{0984E0D0-E2CD-9941-5C95-D1800EE96B0D}"/>
+              </a:ext>
+            </a:extLst>
+          </p:cNvPr>
+          <p:cNvPicPr>
+            <a:picLocks noChangeAspect="1" noChangeArrowheads="1"/>
+          </p:cNvPicPr>
+          <p:nvPr/>
+        </p:nvPicPr>
+        <p:blipFill>
+          <a:blip r:embed="rId7">
+            <a:extLst>
+              <a:ext uri="{28A0092B-C50C-407E-A947-70E740481C1C}">
+                <a14:useLocalDpi xmlns:a14="http://schemas.microsoft.com/office/drawing/2010/main" val="0"/>
+              </a:ext>
+            </a:extLst>
+          </a:blip>
+          <a:srcRect/>
+          <a:stretch>
+            <a:fillRect/>
+          </a:stretch>
+        </p:blipFill>
+        <p:spPr bwMode="auto">
+          <a:xfrm>
+            <a:off x="2255865" y="3918647"/>
+            <a:ext cx="1285749" cy="1257428"/>
+          </a:xfrm>
+          <a:prstGeom prst="rect">
+            <a:avLst/>
+          </a:prstGeom>
+          <a:noFill/>
+          <a:extLst>
+            <a:ext uri="{909E8E84-426E-40DD-AFC4-6F175D3DCCD1}">
+              <a14:hiddenFill xmlns:a14="http://schemas.microsoft.com/office/drawing/2010/main">
+                <a:solidFill>
+                  <a:srgbClr val="FFFFFF"/>
+                </a:solidFill>
+              </a14:hiddenFill>
+            </a:ext>
+          </a:extLst>
+        </p:spPr>
+      </p:pic>
+      <p:pic>
+        <p:nvPicPr>
+          <p:cNvPr id="1026" name="Picture 2" descr="jquery-logo-vertical_large_square - OpenJS Foundation">
+            <a:extLst>
+              <a:ext uri="{FF2B5EF4-FFF2-40B4-BE49-F238E27FC236}">
+                <a16:creationId xmlns:a16="http://schemas.microsoft.com/office/drawing/2014/main" id="{168108D8-AB30-577F-30E3-2D4BC81BD57A}"/>
+              </a:ext>
+            </a:extLst>
+          </p:cNvPr>
+          <p:cNvPicPr>
+            <a:picLocks noChangeAspect="1" noChangeArrowheads="1"/>
+          </p:cNvPicPr>
+          <p:nvPr/>
+        </p:nvPicPr>
+        <p:blipFill>
+          <a:blip r:embed="rId8">
+            <a:extLst>
+              <a:ext uri="{28A0092B-C50C-407E-A947-70E740481C1C}">
+                <a14:useLocalDpi xmlns:a14="http://schemas.microsoft.com/office/drawing/2010/main" val="0"/>
+              </a:ext>
+            </a:extLst>
+          </a:blip>
+          <a:srcRect/>
+          <a:stretch>
+            <a:fillRect/>
+          </a:stretch>
+        </p:blipFill>
+        <p:spPr bwMode="auto">
+          <a:xfrm>
+            <a:off x="7828424" y="3791115"/>
+            <a:ext cx="1643927" cy="1643927"/>
+          </a:xfrm>
+          <a:prstGeom prst="rect">
+            <a:avLst/>
+          </a:prstGeom>
+          <a:noFill/>
+          <a:extLst>
+            <a:ext uri="{909E8E84-426E-40DD-AFC4-6F175D3DCCD1}">
+              <a14:hiddenFill xmlns:a14="http://schemas.microsoft.com/office/drawing/2010/main">
+                <a:solidFill>
+                  <a:srgbClr val="FFFFFF"/>
+                </a:solidFill>
+              </a14:hiddenFill>
+            </a:ext>
+          </a:extLst>
+        </p:spPr>
+      </p:pic>
+    </p:spTree>
+    <p:extLst>
+      <p:ext uri="{BB962C8B-B14F-4D97-AF65-F5344CB8AC3E}">
+        <p14:creationId xmlns:p14="http://schemas.microsoft.com/office/powerpoint/2010/main" val="1213150612"/>
+      </p:ext>
+    </p:extLst>
+  </p:cSld>
+  <p:clrMapOvr>
+    <a:masterClrMapping/>
+  </p:clrMapOvr>
+</p:sld>
+</file>
+
+<file path=ppt/slides/slide5.xml><?xml version="1.0" encoding="utf-8"?>
+<p:sld xmlns:a="http://schemas.openxmlformats.org/drawingml/2006/main" xmlns:r="http://schemas.openxmlformats.org/officeDocument/2006/relationships" xmlns:p="http://schemas.openxmlformats.org/presentationml/2006/main">
+  <p:cSld>
+    <p:spTree>
+      <p:nvGrpSpPr>
+        <p:cNvPr id="1" name=""/>
+        <p:cNvGrpSpPr/>
+        <p:nvPr/>
+      </p:nvGrpSpPr>
+      <p:grpSpPr>
+        <a:xfrm>
+          <a:off x="0" y="0"/>
+          <a:ext cx="0" cy="0"/>
+          <a:chOff x="0" y="0"/>
+          <a:chExt cx="0" cy="0"/>
+        </a:xfrm>
+      </p:grpSpPr>
+      <p:sp>
+        <p:nvSpPr>
+          <p:cNvPr id="2" name="Title 1">
+            <a:extLst>
+              <a:ext uri="{FF2B5EF4-FFF2-40B4-BE49-F238E27FC236}">
                 <a16:creationId xmlns:a16="http://schemas.microsoft.com/office/drawing/2014/main" id="{BFFFF6ED-AAED-2289-7603-7A9EF1EAE4A1}"/>
               </a:ext>
             </a:extLst>
@@ -5862,7 +8116,7 @@
 </p:sld>
 </file>
 
-<file path=ppt/slides/slide5.xml><?xml version="1.0" encoding="utf-8"?>
+<file path=ppt/slides/slide6.xml><?xml version="1.0" encoding="utf-8"?>
 <p:sld xmlns:a="http://schemas.openxmlformats.org/drawingml/2006/main" xmlns:r="http://schemas.openxmlformats.org/officeDocument/2006/relationships" xmlns:p="http://schemas.openxmlformats.org/presentationml/2006/main">
   <p:cSld>
     <p:spTree>
@@ -7629,7 +9883,7 @@
 </p:sld>
 </file>
 
-<file path=ppt/slides/slide6.xml><?xml version="1.0" encoding="utf-8"?>
+<file path=ppt/slides/slide7.xml><?xml version="1.0" encoding="utf-8"?>
 <p:sld xmlns:a="http://schemas.openxmlformats.org/drawingml/2006/main" xmlns:r="http://schemas.openxmlformats.org/officeDocument/2006/relationships" xmlns:p="http://schemas.openxmlformats.org/presentationml/2006/main">
   <p:cSld>
     <p:spTree>
@@ -9396,7 +11650,7 @@
 </p:sld>
 </file>
 
-<file path=ppt/slides/slide7.xml><?xml version="1.0" encoding="utf-8"?>
+<file path=ppt/slides/slide8.xml><?xml version="1.0" encoding="utf-8"?>
 <p:sld xmlns:a="http://schemas.openxmlformats.org/drawingml/2006/main" xmlns:r="http://schemas.openxmlformats.org/officeDocument/2006/relationships" xmlns:p="http://schemas.openxmlformats.org/presentationml/2006/main">
   <p:cSld>
     <p:spTree>
@@ -10924,6 +13178,178 @@
     <p:extLst>
       <p:ext uri="{BB962C8B-B14F-4D97-AF65-F5344CB8AC3E}">
         <p14:creationId xmlns:p14="http://schemas.microsoft.com/office/powerpoint/2010/main" val="3517433495"/>
+      </p:ext>
+    </p:extLst>
+  </p:cSld>
+  <p:clrMapOvr>
+    <a:masterClrMapping/>
+  </p:clrMapOvr>
+</p:sld>
+</file>
+
+<file path=ppt/slides/slide9.xml><?xml version="1.0" encoding="utf-8"?>
+<p:sld xmlns:a="http://schemas.openxmlformats.org/drawingml/2006/main" xmlns:r="http://schemas.openxmlformats.org/officeDocument/2006/relationships" xmlns:p="http://schemas.openxmlformats.org/presentationml/2006/main">
+  <p:cSld>
+    <p:spTree>
+      <p:nvGrpSpPr>
+        <p:cNvPr id="1" name=""/>
+        <p:cNvGrpSpPr/>
+        <p:nvPr/>
+      </p:nvGrpSpPr>
+      <p:grpSpPr>
+        <a:xfrm>
+          <a:off x="0" y="0"/>
+          <a:ext cx="0" cy="0"/>
+          <a:chOff x="0" y="0"/>
+          <a:chExt cx="0" cy="0"/>
+        </a:xfrm>
+      </p:grpSpPr>
+      <p:pic>
+        <p:nvPicPr>
+          <p:cNvPr id="3" name="Picture 2" descr="No description available.">
+            <a:extLst>
+              <a:ext uri="{FF2B5EF4-FFF2-40B4-BE49-F238E27FC236}">
+                <a16:creationId xmlns:a16="http://schemas.microsoft.com/office/drawing/2014/main" id="{269F6E5F-8E22-B915-D7B0-29176E37984A}"/>
+              </a:ext>
+            </a:extLst>
+          </p:cNvPr>
+          <p:cNvPicPr>
+            <a:picLocks noChangeAspect="1" noChangeArrowheads="1"/>
+          </p:cNvPicPr>
+          <p:nvPr/>
+        </p:nvPicPr>
+        <p:blipFill>
+          <a:blip r:embed="rId2">
+            <a:extLst>
+              <a:ext uri="{28A0092B-C50C-407E-A947-70E740481C1C}">
+                <a14:useLocalDpi xmlns:a14="http://schemas.microsoft.com/office/drawing/2010/main" val="0"/>
+              </a:ext>
+            </a:extLst>
+          </a:blip>
+          <a:srcRect/>
+          <a:stretch>
+            <a:fillRect/>
+          </a:stretch>
+        </p:blipFill>
+        <p:spPr bwMode="auto">
+          <a:xfrm>
+            <a:off x="7501814" y="46653"/>
+            <a:ext cx="2724537" cy="6148874"/>
+          </a:xfrm>
+          <a:prstGeom prst="rect">
+            <a:avLst/>
+          </a:prstGeom>
+          <a:noFill/>
+          <a:extLst>
+            <a:ext uri="{909E8E84-426E-40DD-AFC4-6F175D3DCCD1}">
+              <a14:hiddenFill xmlns:a14="http://schemas.microsoft.com/office/drawing/2010/main">
+                <a:solidFill>
+                  <a:srgbClr val="FFFFFF"/>
+                </a:solidFill>
+              </a14:hiddenFill>
+            </a:ext>
+          </a:extLst>
+        </p:spPr>
+      </p:pic>
+      <p:sp>
+        <p:nvSpPr>
+          <p:cNvPr id="4" name="Rectangle 3">
+            <a:extLst>
+              <a:ext uri="{FF2B5EF4-FFF2-40B4-BE49-F238E27FC236}">
+                <a16:creationId xmlns:a16="http://schemas.microsoft.com/office/drawing/2014/main" id="{46491209-C561-DCCB-882A-526B016F5D0A}"/>
+              </a:ext>
+            </a:extLst>
+          </p:cNvPr>
+          <p:cNvSpPr/>
+          <p:nvPr/>
+        </p:nvSpPr>
+        <p:spPr>
+          <a:xfrm>
+            <a:off x="0" y="0"/>
+            <a:ext cx="5337110" cy="6410131"/>
+          </a:xfrm>
+          <a:prstGeom prst="rect">
+            <a:avLst/>
+          </a:prstGeom>
+          <a:solidFill>
+            <a:srgbClr val="21B9A0"/>
+          </a:solidFill>
+        </p:spPr>
+        <p:style>
+          <a:lnRef idx="2">
+            <a:schemeClr val="accent1">
+              <a:shade val="50000"/>
+            </a:schemeClr>
+          </a:lnRef>
+          <a:fillRef idx="1">
+            <a:schemeClr val="accent1"/>
+          </a:fillRef>
+          <a:effectRef idx="0">
+            <a:schemeClr val="accent1"/>
+          </a:effectRef>
+          <a:fontRef idx="minor">
+            <a:schemeClr val="lt1"/>
+          </a:fontRef>
+        </p:style>
+        <p:txBody>
+          <a:bodyPr rtlCol="0" anchor="ctr"/>
+          <a:lstStyle/>
+          <a:p>
+            <a:pPr algn="ctr"/>
+            <a:endParaRPr lang="en-PH">
+              <a:solidFill>
+                <a:srgbClr val="21B9A0"/>
+              </a:solidFill>
+            </a:endParaRPr>
+          </a:p>
+        </p:txBody>
+      </p:sp>
+      <p:sp>
+        <p:nvSpPr>
+          <p:cNvPr id="2" name="Title 1">
+            <a:extLst>
+              <a:ext uri="{FF2B5EF4-FFF2-40B4-BE49-F238E27FC236}">
+                <a16:creationId xmlns:a16="http://schemas.microsoft.com/office/drawing/2014/main" id="{BFFFF6ED-AAED-2289-7603-7A9EF1EAE4A1}"/>
+              </a:ext>
+            </a:extLst>
+          </p:cNvPr>
+          <p:cNvSpPr>
+            <a:spLocks noGrp="1"/>
+          </p:cNvSpPr>
+          <p:nvPr>
+            <p:ph type="title" idx="4294967295"/>
+          </p:nvPr>
+        </p:nvSpPr>
+        <p:spPr>
+          <a:xfrm>
+            <a:off x="307910" y="2215179"/>
+            <a:ext cx="10058400" cy="1450975"/>
+          </a:xfrm>
+        </p:spPr>
+        <p:txBody>
+          <a:bodyPr>
+            <a:normAutofit/>
+          </a:bodyPr>
+          <a:lstStyle/>
+          <a:p>
+            <a:r>
+              <a:rPr lang="en-PH" sz="6000" dirty="0">
+                <a:solidFill>
+                  <a:schemeClr val="tx1">
+                    <a:lumMod val="95000"/>
+                    <a:lumOff val="5000"/>
+                  </a:schemeClr>
+                </a:solidFill>
+              </a:rPr>
+              <a:t>Wire Frame</a:t>
+            </a:r>
+          </a:p>
+        </p:txBody>
+      </p:sp>
+    </p:spTree>
+    <p:extLst>
+      <p:ext uri="{BB962C8B-B14F-4D97-AF65-F5344CB8AC3E}">
+        <p14:creationId xmlns:p14="http://schemas.microsoft.com/office/powerpoint/2010/main" val="2920554908"/>
       </p:ext>
     </p:extLst>
   </p:cSld>

</xml_diff>